<commit_message>
Fixing minor changes in presentation
</commit_message>
<xml_diff>
--- a/Presentation/Presentation team_entropy.pptx
+++ b/Presentation/Presentation team_entropy.pptx
@@ -4969,63 +4969,63 @@
     </dgm:pt>
   </dgm:ptLst>
   <dgm:cxnLst>
-    <dgm:cxn modelId="{41709B0A-BEBB-444C-B1DF-A12F6968D85F}" type="presOf" srcId="{96ABDD50-DA5A-456C-9FD8-3EEADFA01F41}" destId="{D599221A-A138-4CD6-A313-7C9BFEE0FF26}" srcOrd="1" destOrd="0" presId="urn:microsoft.com/office/officeart/2005/8/layout/cycle8"/>
-    <dgm:cxn modelId="{79FFE212-06BF-43CC-A22C-AAB2A624824D}" type="presOf" srcId="{8E36E328-E0AB-4E5B-94C9-495FE97A8364}" destId="{7FBAF46B-90B6-4298-B08E-422BD738310E}" srcOrd="0" destOrd="0" presId="urn:microsoft.com/office/officeart/2005/8/layout/cycle8"/>
+    <dgm:cxn modelId="{60879010-3193-40D8-929E-E4F6B3A478EE}" type="presOf" srcId="{056350B4-02CE-4D5D-A038-00B461BFDD04}" destId="{3F62D2A4-CA02-439F-A799-1A4AB377F075}" srcOrd="1" destOrd="0" presId="urn:microsoft.com/office/officeart/2005/8/layout/cycle8"/>
     <dgm:cxn modelId="{FE6E3825-B35B-43AD-905E-8D5ADAA2C399}" srcId="{AF7C659B-EFF3-481A-A743-E67C1F1DF5D6}" destId="{37027A68-E37C-4C0A-B350-BA8DD2050298}" srcOrd="2" destOrd="0" parTransId="{0822B16C-5F19-4114-973A-EF2E9AF489EE}" sibTransId="{5072F3AF-7BCF-4996-84AF-EDC1E5BD378B}"/>
-    <dgm:cxn modelId="{0F2D622A-603E-435A-BBBE-29AFDDA75B21}" type="presOf" srcId="{37027A68-E37C-4C0A-B350-BA8DD2050298}" destId="{D74FD675-9A21-466D-B5B6-FED0A40247E4}" srcOrd="1" destOrd="0" presId="urn:microsoft.com/office/officeart/2005/8/layout/cycle8"/>
-    <dgm:cxn modelId="{724D082D-D1CA-40A5-8AC3-26FD28DDBCB4}" type="presOf" srcId="{9EEDC5EB-7579-4C2D-96F0-A24294EA6E23}" destId="{6034AE0E-874C-4500-8012-8719677D48D1}" srcOrd="1" destOrd="0" presId="urn:microsoft.com/office/officeart/2005/8/layout/cycle8"/>
-    <dgm:cxn modelId="{2A524239-7EAC-4523-82EC-83EF5EE4081B}" type="presOf" srcId="{512E5E7D-CD6E-43FB-A078-ED6879B747E5}" destId="{D8CF0E5B-270E-4EAB-BC82-FA2FE2A19C2B}" srcOrd="1" destOrd="0" presId="urn:microsoft.com/office/officeart/2005/8/layout/cycle8"/>
-    <dgm:cxn modelId="{FB351869-476E-40F8-8AAE-A0286420EEA1}" type="presOf" srcId="{AF7C659B-EFF3-481A-A743-E67C1F1DF5D6}" destId="{FC97EDF3-AE1C-4ECA-8381-4DC2F6BE37C3}" srcOrd="0" destOrd="0" presId="urn:microsoft.com/office/officeart/2005/8/layout/cycle8"/>
-    <dgm:cxn modelId="{9C05F24C-6ED3-4516-89F3-20F8FD69AA0C}" type="presOf" srcId="{D1336FC8-4369-4D50-B247-D1D49FFC0E6C}" destId="{FD37096B-61AC-4509-BE17-58D8E61BED35}" srcOrd="1" destOrd="0" presId="urn:microsoft.com/office/officeart/2005/8/layout/cycle8"/>
-    <dgm:cxn modelId="{8861006D-DCB3-4C48-91CF-12BFF10FE2A3}" type="presOf" srcId="{512E5E7D-CD6E-43FB-A078-ED6879B747E5}" destId="{76911B7B-8C6D-42D0-92BD-4FB316B86F44}" srcOrd="0" destOrd="0" presId="urn:microsoft.com/office/officeart/2005/8/layout/cycle8"/>
+    <dgm:cxn modelId="{0148AB41-EAF0-4C7F-8FEC-55893AB3F8FA}" type="presOf" srcId="{AF7C659B-EFF3-481A-A743-E67C1F1DF5D6}" destId="{FC97EDF3-AE1C-4ECA-8381-4DC2F6BE37C3}" srcOrd="0" destOrd="0" presId="urn:microsoft.com/office/officeart/2005/8/layout/cycle8"/>
+    <dgm:cxn modelId="{4A041C43-69F3-4634-BB31-B6D0B4AFB3D8}" type="presOf" srcId="{9EEDC5EB-7579-4C2D-96F0-A24294EA6E23}" destId="{996FF857-F067-4447-96FC-75F83EF92294}" srcOrd="0" destOrd="0" presId="urn:microsoft.com/office/officeart/2005/8/layout/cycle8"/>
+    <dgm:cxn modelId="{E93C2A6A-CB0A-4794-AB22-72D31E605BBA}" type="presOf" srcId="{D1336FC8-4369-4D50-B247-D1D49FFC0E6C}" destId="{FD37096B-61AC-4509-BE17-58D8E61BED35}" srcOrd="1" destOrd="0" presId="urn:microsoft.com/office/officeart/2005/8/layout/cycle8"/>
     <dgm:cxn modelId="{2CF27251-4E25-4B17-A713-73A31D449BF9}" srcId="{AF7C659B-EFF3-481A-A743-E67C1F1DF5D6}" destId="{9EEDC5EB-7579-4C2D-96F0-A24294EA6E23}" srcOrd="5" destOrd="0" parTransId="{F698D129-4D86-416B-AA22-34459334BF54}" sibTransId="{3583D753-FF64-4886-8411-28C25229E8F4}"/>
+    <dgm:cxn modelId="{67EED573-5F8E-49E6-B391-8BD3F56ED314}" type="presOf" srcId="{37027A68-E37C-4C0A-B350-BA8DD2050298}" destId="{D74FD675-9A21-466D-B5B6-FED0A40247E4}" srcOrd="1" destOrd="0" presId="urn:microsoft.com/office/officeart/2005/8/layout/cycle8"/>
+    <dgm:cxn modelId="{2DDCEF73-3291-4322-B21D-8A7DF601E5C8}" type="presOf" srcId="{056350B4-02CE-4D5D-A038-00B461BFDD04}" destId="{D3B58615-0FC7-42DD-81FB-11A2F978F79C}" srcOrd="0" destOrd="0" presId="urn:microsoft.com/office/officeart/2005/8/layout/cycle8"/>
     <dgm:cxn modelId="{72BA407B-D38A-41B3-BEC1-4CFDCE6D8E3E}" srcId="{AF7C659B-EFF3-481A-A743-E67C1F1DF5D6}" destId="{D1336FC8-4369-4D50-B247-D1D49FFC0E6C}" srcOrd="1" destOrd="0" parTransId="{521970D2-1F2D-4B25-8303-0D3FA019C0D8}" sibTransId="{9A1E4A98-7B7F-4CD7-B865-A990C1AC7226}"/>
-    <dgm:cxn modelId="{5DD3B07E-BEDB-4141-B945-A082B9F4D35E}" type="presOf" srcId="{37027A68-E37C-4C0A-B350-BA8DD2050298}" destId="{FB1CA0E9-11F8-499A-B0C1-F398DB9EF03A}" srcOrd="0" destOrd="0" presId="urn:microsoft.com/office/officeart/2005/8/layout/cycle8"/>
-    <dgm:cxn modelId="{3FF12192-04AF-458B-A6D1-B676BF014506}" type="presOf" srcId="{96ABDD50-DA5A-456C-9FD8-3EEADFA01F41}" destId="{60511FBD-357F-4A50-8EA6-B33481836715}" srcOrd="0" destOrd="0" presId="urn:microsoft.com/office/officeart/2005/8/layout/cycle8"/>
-    <dgm:cxn modelId="{CCA91F93-8170-49BA-BE85-6F05E0FA4EB0}" type="presOf" srcId="{8E36E328-E0AB-4E5B-94C9-495FE97A8364}" destId="{53C45E87-8062-4F3C-90C3-144159060197}" srcOrd="1" destOrd="0" presId="urn:microsoft.com/office/officeart/2005/8/layout/cycle8"/>
-    <dgm:cxn modelId="{A898D994-F02D-4260-8264-4BD6DEFE24BA}" type="presOf" srcId="{056350B4-02CE-4D5D-A038-00B461BFDD04}" destId="{3F62D2A4-CA02-439F-A799-1A4AB377F075}" srcOrd="1" destOrd="0" presId="urn:microsoft.com/office/officeart/2005/8/layout/cycle8"/>
+    <dgm:cxn modelId="{53036B82-93E6-41A2-A1E2-FB3B3468AA0A}" type="presOf" srcId="{512E5E7D-CD6E-43FB-A078-ED6879B747E5}" destId="{76911B7B-8C6D-42D0-92BD-4FB316B86F44}" srcOrd="0" destOrd="0" presId="urn:microsoft.com/office/officeart/2005/8/layout/cycle8"/>
+    <dgm:cxn modelId="{EAC197A4-ACA8-4EFB-9F2D-4CCFFE00C739}" type="presOf" srcId="{37027A68-E37C-4C0A-B350-BA8DD2050298}" destId="{FB1CA0E9-11F8-499A-B0C1-F398DB9EF03A}" srcOrd="0" destOrd="0" presId="urn:microsoft.com/office/officeart/2005/8/layout/cycle8"/>
+    <dgm:cxn modelId="{9535BDB1-4198-4A7C-A76C-D012B0767DFC}" type="presOf" srcId="{9EEDC5EB-7579-4C2D-96F0-A24294EA6E23}" destId="{6034AE0E-874C-4500-8012-8719677D48D1}" srcOrd="1" destOrd="0" presId="urn:microsoft.com/office/officeart/2005/8/layout/cycle8"/>
+    <dgm:cxn modelId="{DF57FFB8-D9DF-469D-A096-46A4C8094D45}" type="presOf" srcId="{96ABDD50-DA5A-456C-9FD8-3EEADFA01F41}" destId="{60511FBD-357F-4A50-8EA6-B33481836715}" srcOrd="0" destOrd="0" presId="urn:microsoft.com/office/officeart/2005/8/layout/cycle8"/>
     <dgm:cxn modelId="{C32634BC-ED5B-4BB9-B667-B5C6B373BE2C}" srcId="{AF7C659B-EFF3-481A-A743-E67C1F1DF5D6}" destId="{056350B4-02CE-4D5D-A038-00B461BFDD04}" srcOrd="4" destOrd="0" parTransId="{946BE602-0FEA-48A1-8AF9-A64A0542389C}" sibTransId="{1AA796E6-ED9E-4030-8836-62039D290DB7}"/>
     <dgm:cxn modelId="{F0BC12C0-6DB4-48FA-A101-87FA5215CCE8}" srcId="{AF7C659B-EFF3-481A-A743-E67C1F1DF5D6}" destId="{8E36E328-E0AB-4E5B-94C9-495FE97A8364}" srcOrd="0" destOrd="0" parTransId="{E168D145-06FD-4BFB-9994-269CA259BEBF}" sibTransId="{28465C2D-FF85-46EF-ADEA-7026EB148486}"/>
+    <dgm:cxn modelId="{12093BC5-270E-4225-9A2B-31B73659074B}" type="presOf" srcId="{D1336FC8-4369-4D50-B247-D1D49FFC0E6C}" destId="{4C88B959-8A95-4A3E-B731-A19160E8C625}" srcOrd="0" destOrd="0" presId="urn:microsoft.com/office/officeart/2005/8/layout/cycle8"/>
     <dgm:cxn modelId="{1BAB63DC-26EF-43BF-8E19-8AFB5DDDA68B}" srcId="{AF7C659B-EFF3-481A-A743-E67C1F1DF5D6}" destId="{512E5E7D-CD6E-43FB-A078-ED6879B747E5}" srcOrd="6" destOrd="0" parTransId="{D87F1406-CB69-48B4-8448-C1099DA49245}" sibTransId="{22B90CDB-420D-4888-B138-56E4B5A192DF}"/>
-    <dgm:cxn modelId="{EAFBC1E1-75A2-4A9B-B332-5FD36F046F86}" type="presOf" srcId="{9EEDC5EB-7579-4C2D-96F0-A24294EA6E23}" destId="{996FF857-F067-4447-96FC-75F83EF92294}" srcOrd="0" destOrd="0" presId="urn:microsoft.com/office/officeart/2005/8/layout/cycle8"/>
-    <dgm:cxn modelId="{FCD5A5E2-5B61-46C3-8061-5B2FCB87692F}" type="presOf" srcId="{056350B4-02CE-4D5D-A038-00B461BFDD04}" destId="{D3B58615-0FC7-42DD-81FB-11A2F978F79C}" srcOrd="0" destOrd="0" presId="urn:microsoft.com/office/officeart/2005/8/layout/cycle8"/>
-    <dgm:cxn modelId="{208FA4F3-526A-4DDA-8435-BEE3A04F4CF9}" type="presOf" srcId="{D1336FC8-4369-4D50-B247-D1D49FFC0E6C}" destId="{4C88B959-8A95-4A3E-B731-A19160E8C625}" srcOrd="0" destOrd="0" presId="urn:microsoft.com/office/officeart/2005/8/layout/cycle8"/>
+    <dgm:cxn modelId="{6A3A03DD-402A-4615-ADE0-133412BE35C2}" type="presOf" srcId="{96ABDD50-DA5A-456C-9FD8-3EEADFA01F41}" destId="{D599221A-A138-4CD6-A313-7C9BFEE0FF26}" srcOrd="1" destOrd="0" presId="urn:microsoft.com/office/officeart/2005/8/layout/cycle8"/>
+    <dgm:cxn modelId="{32080DDD-900D-4F7B-900E-8A60F4CD6808}" type="presOf" srcId="{8E36E328-E0AB-4E5B-94C9-495FE97A8364}" destId="{53C45E87-8062-4F3C-90C3-144159060197}" srcOrd="1" destOrd="0" presId="urn:microsoft.com/office/officeart/2005/8/layout/cycle8"/>
+    <dgm:cxn modelId="{8B21CCDF-F2E3-4D1C-A1B4-D8F2B500ED6B}" type="presOf" srcId="{8E36E328-E0AB-4E5B-94C9-495FE97A8364}" destId="{7FBAF46B-90B6-4298-B08E-422BD738310E}" srcOrd="0" destOrd="0" presId="urn:microsoft.com/office/officeart/2005/8/layout/cycle8"/>
+    <dgm:cxn modelId="{A40F9BF6-DE7A-40F8-8FEC-FA72098EE995}" type="presOf" srcId="{512E5E7D-CD6E-43FB-A078-ED6879B747E5}" destId="{D8CF0E5B-270E-4EAB-BC82-FA2FE2A19C2B}" srcOrd="1" destOrd="0" presId="urn:microsoft.com/office/officeart/2005/8/layout/cycle8"/>
     <dgm:cxn modelId="{ED1E18FC-13B4-4865-AB88-7414AD7BE7D3}" srcId="{AF7C659B-EFF3-481A-A743-E67C1F1DF5D6}" destId="{96ABDD50-DA5A-456C-9FD8-3EEADFA01F41}" srcOrd="3" destOrd="0" parTransId="{8DB413EA-4532-4F0E-993C-4728B6C00690}" sibTransId="{98D69A4A-21EF-4E3B-9022-3C36A2C8C9DD}"/>
-    <dgm:cxn modelId="{6DADD0F8-3E87-415C-8291-7C33AD9380D0}" type="presParOf" srcId="{FC97EDF3-AE1C-4ECA-8381-4DC2F6BE37C3}" destId="{7FBAF46B-90B6-4298-B08E-422BD738310E}" srcOrd="0" destOrd="0" presId="urn:microsoft.com/office/officeart/2005/8/layout/cycle8"/>
-    <dgm:cxn modelId="{9EACEB3B-F113-419E-AE5C-36E42B6F3107}" type="presParOf" srcId="{FC97EDF3-AE1C-4ECA-8381-4DC2F6BE37C3}" destId="{1AE3FE14-8305-49D7-8717-9E005F2DA867}" srcOrd="1" destOrd="0" presId="urn:microsoft.com/office/officeart/2005/8/layout/cycle8"/>
-    <dgm:cxn modelId="{A3DD8EA8-154F-46A4-B4F2-9B085CBB1C10}" type="presParOf" srcId="{FC97EDF3-AE1C-4ECA-8381-4DC2F6BE37C3}" destId="{81B44840-2ED6-41F2-B66C-D97B08734D5F}" srcOrd="2" destOrd="0" presId="urn:microsoft.com/office/officeart/2005/8/layout/cycle8"/>
-    <dgm:cxn modelId="{7BF865D1-0525-4BF0-B917-C3CBD64A9151}" type="presParOf" srcId="{FC97EDF3-AE1C-4ECA-8381-4DC2F6BE37C3}" destId="{53C45E87-8062-4F3C-90C3-144159060197}" srcOrd="3" destOrd="0" presId="urn:microsoft.com/office/officeart/2005/8/layout/cycle8"/>
-    <dgm:cxn modelId="{97B633BD-3785-4EBB-9DB2-D7F274DC6D50}" type="presParOf" srcId="{FC97EDF3-AE1C-4ECA-8381-4DC2F6BE37C3}" destId="{4C88B959-8A95-4A3E-B731-A19160E8C625}" srcOrd="4" destOrd="0" presId="urn:microsoft.com/office/officeart/2005/8/layout/cycle8"/>
-    <dgm:cxn modelId="{30FA0031-39FB-4A02-8B19-18EBC5647C28}" type="presParOf" srcId="{FC97EDF3-AE1C-4ECA-8381-4DC2F6BE37C3}" destId="{197087BF-C65D-4E91-A884-F1D21A60ED60}" srcOrd="5" destOrd="0" presId="urn:microsoft.com/office/officeart/2005/8/layout/cycle8"/>
-    <dgm:cxn modelId="{22E4EB11-03AA-4392-BE40-06FB677E371C}" type="presParOf" srcId="{FC97EDF3-AE1C-4ECA-8381-4DC2F6BE37C3}" destId="{FCC1E32F-C3A6-4147-B7BF-521AD9FD5B04}" srcOrd="6" destOrd="0" presId="urn:microsoft.com/office/officeart/2005/8/layout/cycle8"/>
-    <dgm:cxn modelId="{B2853D8E-C263-4A11-A92C-3A6F22697AC3}" type="presParOf" srcId="{FC97EDF3-AE1C-4ECA-8381-4DC2F6BE37C3}" destId="{FD37096B-61AC-4509-BE17-58D8E61BED35}" srcOrd="7" destOrd="0" presId="urn:microsoft.com/office/officeart/2005/8/layout/cycle8"/>
-    <dgm:cxn modelId="{B8CC5729-7A8A-4E87-9879-032376B81702}" type="presParOf" srcId="{FC97EDF3-AE1C-4ECA-8381-4DC2F6BE37C3}" destId="{FB1CA0E9-11F8-499A-B0C1-F398DB9EF03A}" srcOrd="8" destOrd="0" presId="urn:microsoft.com/office/officeart/2005/8/layout/cycle8"/>
-    <dgm:cxn modelId="{AB6FA01F-9E01-4592-8BC8-648D1E0EECC9}" type="presParOf" srcId="{FC97EDF3-AE1C-4ECA-8381-4DC2F6BE37C3}" destId="{E4BD4BA9-58F6-47A4-A1AA-66E50DC3345C}" srcOrd="9" destOrd="0" presId="urn:microsoft.com/office/officeart/2005/8/layout/cycle8"/>
-    <dgm:cxn modelId="{1372E14E-E346-40A8-A63F-B9F4B2CFC833}" type="presParOf" srcId="{FC97EDF3-AE1C-4ECA-8381-4DC2F6BE37C3}" destId="{35A80986-AD35-42EC-B3BF-BEA0544DA6CB}" srcOrd="10" destOrd="0" presId="urn:microsoft.com/office/officeart/2005/8/layout/cycle8"/>
-    <dgm:cxn modelId="{4D25A92B-4336-470B-BC29-C2DDF4C9E45E}" type="presParOf" srcId="{FC97EDF3-AE1C-4ECA-8381-4DC2F6BE37C3}" destId="{D74FD675-9A21-466D-B5B6-FED0A40247E4}" srcOrd="11" destOrd="0" presId="urn:microsoft.com/office/officeart/2005/8/layout/cycle8"/>
-    <dgm:cxn modelId="{A1CF7F15-4690-4C5A-98B9-084C5289DEDA}" type="presParOf" srcId="{FC97EDF3-AE1C-4ECA-8381-4DC2F6BE37C3}" destId="{60511FBD-357F-4A50-8EA6-B33481836715}" srcOrd="12" destOrd="0" presId="urn:microsoft.com/office/officeart/2005/8/layout/cycle8"/>
-    <dgm:cxn modelId="{A93E0556-DC7A-4E03-83E3-11E0423FCBCA}" type="presParOf" srcId="{FC97EDF3-AE1C-4ECA-8381-4DC2F6BE37C3}" destId="{E77950D8-7CB3-4BB9-A632-47D46EA67DFD}" srcOrd="13" destOrd="0" presId="urn:microsoft.com/office/officeart/2005/8/layout/cycle8"/>
-    <dgm:cxn modelId="{A8576B74-5763-4E36-9187-FAC2A2296558}" type="presParOf" srcId="{FC97EDF3-AE1C-4ECA-8381-4DC2F6BE37C3}" destId="{8D76B93D-AD5C-46E6-AAF0-A4F43CFCCE71}" srcOrd="14" destOrd="0" presId="urn:microsoft.com/office/officeart/2005/8/layout/cycle8"/>
-    <dgm:cxn modelId="{A25A5417-99A5-47CA-B732-3A2816360A19}" type="presParOf" srcId="{FC97EDF3-AE1C-4ECA-8381-4DC2F6BE37C3}" destId="{D599221A-A138-4CD6-A313-7C9BFEE0FF26}" srcOrd="15" destOrd="0" presId="urn:microsoft.com/office/officeart/2005/8/layout/cycle8"/>
-    <dgm:cxn modelId="{CEDDB19F-0F52-4D7B-9CDD-792BE2AD4776}" type="presParOf" srcId="{FC97EDF3-AE1C-4ECA-8381-4DC2F6BE37C3}" destId="{D3B58615-0FC7-42DD-81FB-11A2F978F79C}" srcOrd="16" destOrd="0" presId="urn:microsoft.com/office/officeart/2005/8/layout/cycle8"/>
-    <dgm:cxn modelId="{1D136C93-363E-4471-AC4A-EFA9B9CBFBD2}" type="presParOf" srcId="{FC97EDF3-AE1C-4ECA-8381-4DC2F6BE37C3}" destId="{B67054D1-C4D4-4EF7-B6D0-BF3F53D1430D}" srcOrd="17" destOrd="0" presId="urn:microsoft.com/office/officeart/2005/8/layout/cycle8"/>
-    <dgm:cxn modelId="{67A82A40-9AD6-406E-83A3-31FB82EB96DD}" type="presParOf" srcId="{FC97EDF3-AE1C-4ECA-8381-4DC2F6BE37C3}" destId="{585FAA4C-B3BD-4FEC-8995-B3280C6F8996}" srcOrd="18" destOrd="0" presId="urn:microsoft.com/office/officeart/2005/8/layout/cycle8"/>
-    <dgm:cxn modelId="{6F0E518E-6CA7-4ED2-87AC-D8E1C508B01A}" type="presParOf" srcId="{FC97EDF3-AE1C-4ECA-8381-4DC2F6BE37C3}" destId="{3F62D2A4-CA02-439F-A799-1A4AB377F075}" srcOrd="19" destOrd="0" presId="urn:microsoft.com/office/officeart/2005/8/layout/cycle8"/>
-    <dgm:cxn modelId="{CE98088F-2295-4DA3-9C1F-547B406CD623}" type="presParOf" srcId="{FC97EDF3-AE1C-4ECA-8381-4DC2F6BE37C3}" destId="{996FF857-F067-4447-96FC-75F83EF92294}" srcOrd="20" destOrd="0" presId="urn:microsoft.com/office/officeart/2005/8/layout/cycle8"/>
-    <dgm:cxn modelId="{6A75BC4C-2471-4D87-94C4-6B593AC26918}" type="presParOf" srcId="{FC97EDF3-AE1C-4ECA-8381-4DC2F6BE37C3}" destId="{0BC62684-1807-46C2-B3DB-8068209CF78C}" srcOrd="21" destOrd="0" presId="urn:microsoft.com/office/officeart/2005/8/layout/cycle8"/>
-    <dgm:cxn modelId="{EDEE0796-367F-4920-A494-8C8C92DBEB13}" type="presParOf" srcId="{FC97EDF3-AE1C-4ECA-8381-4DC2F6BE37C3}" destId="{1696EFDF-5A2C-4B99-8582-303102DD17CF}" srcOrd="22" destOrd="0" presId="urn:microsoft.com/office/officeart/2005/8/layout/cycle8"/>
-    <dgm:cxn modelId="{EDC681FF-7D5F-4930-941C-62423884A4E2}" type="presParOf" srcId="{FC97EDF3-AE1C-4ECA-8381-4DC2F6BE37C3}" destId="{6034AE0E-874C-4500-8012-8719677D48D1}" srcOrd="23" destOrd="0" presId="urn:microsoft.com/office/officeart/2005/8/layout/cycle8"/>
-    <dgm:cxn modelId="{509EEFF1-8D7E-4CE5-9AF0-6E9D32AC87A4}" type="presParOf" srcId="{FC97EDF3-AE1C-4ECA-8381-4DC2F6BE37C3}" destId="{76911B7B-8C6D-42D0-92BD-4FB316B86F44}" srcOrd="24" destOrd="0" presId="urn:microsoft.com/office/officeart/2005/8/layout/cycle8"/>
-    <dgm:cxn modelId="{72555DDB-B504-4D49-AECF-1966DE8F2632}" type="presParOf" srcId="{FC97EDF3-AE1C-4ECA-8381-4DC2F6BE37C3}" destId="{E6C7F39B-1696-4991-AF41-F9CA12606661}" srcOrd="25" destOrd="0" presId="urn:microsoft.com/office/officeart/2005/8/layout/cycle8"/>
-    <dgm:cxn modelId="{F7D997BA-D9A3-4C74-8F10-647D1B675C0A}" type="presParOf" srcId="{FC97EDF3-AE1C-4ECA-8381-4DC2F6BE37C3}" destId="{48D3C65C-A506-49FE-AF78-E80DD9F4A033}" srcOrd="26" destOrd="0" presId="urn:microsoft.com/office/officeart/2005/8/layout/cycle8"/>
-    <dgm:cxn modelId="{5734D955-757E-4DC0-A977-E01B0DE37F35}" type="presParOf" srcId="{FC97EDF3-AE1C-4ECA-8381-4DC2F6BE37C3}" destId="{D8CF0E5B-270E-4EAB-BC82-FA2FE2A19C2B}" srcOrd="27" destOrd="0" presId="urn:microsoft.com/office/officeart/2005/8/layout/cycle8"/>
-    <dgm:cxn modelId="{903CD0CF-0D18-4301-AF15-852C0011EE80}" type="presParOf" srcId="{FC97EDF3-AE1C-4ECA-8381-4DC2F6BE37C3}" destId="{A219F2AD-F808-4AB2-8DBA-50B9995F6A6E}" srcOrd="28" destOrd="0" presId="urn:microsoft.com/office/officeart/2005/8/layout/cycle8"/>
-    <dgm:cxn modelId="{654C1864-CF98-4712-94D4-7BB1564F3A97}" type="presParOf" srcId="{FC97EDF3-AE1C-4ECA-8381-4DC2F6BE37C3}" destId="{8A45E0F2-BEE6-4E40-98B4-15B6C5A0EA89}" srcOrd="29" destOrd="0" presId="urn:microsoft.com/office/officeart/2005/8/layout/cycle8"/>
-    <dgm:cxn modelId="{FE319D1B-2B86-452A-AA50-E54A98C31397}" type="presParOf" srcId="{FC97EDF3-AE1C-4ECA-8381-4DC2F6BE37C3}" destId="{F9852ED8-5BD7-417C-AB31-9272F9B25397}" srcOrd="30" destOrd="0" presId="urn:microsoft.com/office/officeart/2005/8/layout/cycle8"/>
-    <dgm:cxn modelId="{140711C4-0A51-4791-B361-B6865E216DAC}" type="presParOf" srcId="{FC97EDF3-AE1C-4ECA-8381-4DC2F6BE37C3}" destId="{136E9AED-30C5-48AE-A67A-F1F72E5839A2}" srcOrd="31" destOrd="0" presId="urn:microsoft.com/office/officeart/2005/8/layout/cycle8"/>
-    <dgm:cxn modelId="{B543082A-C559-4F17-A04E-08180D19CA0B}" type="presParOf" srcId="{FC97EDF3-AE1C-4ECA-8381-4DC2F6BE37C3}" destId="{F10CA893-7B73-440F-A789-ED313064172D}" srcOrd="32" destOrd="0" presId="urn:microsoft.com/office/officeart/2005/8/layout/cycle8"/>
-    <dgm:cxn modelId="{8C9950C3-E113-4563-BDF8-9980311B1C2A}" type="presParOf" srcId="{FC97EDF3-AE1C-4ECA-8381-4DC2F6BE37C3}" destId="{C49DD70D-D344-49AF-B943-A31F48C81158}" srcOrd="33" destOrd="0" presId="urn:microsoft.com/office/officeart/2005/8/layout/cycle8"/>
-    <dgm:cxn modelId="{0CCE240F-5191-475C-99DF-9455757DDECC}" type="presParOf" srcId="{FC97EDF3-AE1C-4ECA-8381-4DC2F6BE37C3}" destId="{F0DF4F6F-DECC-4715-AA29-F8E444080957}" srcOrd="34" destOrd="0" presId="urn:microsoft.com/office/officeart/2005/8/layout/cycle8"/>
+    <dgm:cxn modelId="{64EDE979-E729-4338-BDE0-014C1EFF3974}" type="presParOf" srcId="{FC97EDF3-AE1C-4ECA-8381-4DC2F6BE37C3}" destId="{7FBAF46B-90B6-4298-B08E-422BD738310E}" srcOrd="0" destOrd="0" presId="urn:microsoft.com/office/officeart/2005/8/layout/cycle8"/>
+    <dgm:cxn modelId="{1C7D0FE5-8DAB-49A8-AED6-BA79534C19AC}" type="presParOf" srcId="{FC97EDF3-AE1C-4ECA-8381-4DC2F6BE37C3}" destId="{1AE3FE14-8305-49D7-8717-9E005F2DA867}" srcOrd="1" destOrd="0" presId="urn:microsoft.com/office/officeart/2005/8/layout/cycle8"/>
+    <dgm:cxn modelId="{99FD672F-C0D3-4148-A483-EA14F5082E72}" type="presParOf" srcId="{FC97EDF3-AE1C-4ECA-8381-4DC2F6BE37C3}" destId="{81B44840-2ED6-41F2-B66C-D97B08734D5F}" srcOrd="2" destOrd="0" presId="urn:microsoft.com/office/officeart/2005/8/layout/cycle8"/>
+    <dgm:cxn modelId="{12599889-1F87-4110-B555-3BBB31BA2B7B}" type="presParOf" srcId="{FC97EDF3-AE1C-4ECA-8381-4DC2F6BE37C3}" destId="{53C45E87-8062-4F3C-90C3-144159060197}" srcOrd="3" destOrd="0" presId="urn:microsoft.com/office/officeart/2005/8/layout/cycle8"/>
+    <dgm:cxn modelId="{386D7ACF-EFCC-4650-ADB8-DA8CB9D61BE5}" type="presParOf" srcId="{FC97EDF3-AE1C-4ECA-8381-4DC2F6BE37C3}" destId="{4C88B959-8A95-4A3E-B731-A19160E8C625}" srcOrd="4" destOrd="0" presId="urn:microsoft.com/office/officeart/2005/8/layout/cycle8"/>
+    <dgm:cxn modelId="{7112CF31-7BD4-485B-BFA3-6303B6BAF557}" type="presParOf" srcId="{FC97EDF3-AE1C-4ECA-8381-4DC2F6BE37C3}" destId="{197087BF-C65D-4E91-A884-F1D21A60ED60}" srcOrd="5" destOrd="0" presId="urn:microsoft.com/office/officeart/2005/8/layout/cycle8"/>
+    <dgm:cxn modelId="{E82C073C-E2FD-4BE6-81FC-5C88C545D850}" type="presParOf" srcId="{FC97EDF3-AE1C-4ECA-8381-4DC2F6BE37C3}" destId="{FCC1E32F-C3A6-4147-B7BF-521AD9FD5B04}" srcOrd="6" destOrd="0" presId="urn:microsoft.com/office/officeart/2005/8/layout/cycle8"/>
+    <dgm:cxn modelId="{792F912B-F354-4A61-A713-E7AC10A17FC2}" type="presParOf" srcId="{FC97EDF3-AE1C-4ECA-8381-4DC2F6BE37C3}" destId="{FD37096B-61AC-4509-BE17-58D8E61BED35}" srcOrd="7" destOrd="0" presId="urn:microsoft.com/office/officeart/2005/8/layout/cycle8"/>
+    <dgm:cxn modelId="{5A4985A4-8A2E-4FD8-81BD-6D020387AF3C}" type="presParOf" srcId="{FC97EDF3-AE1C-4ECA-8381-4DC2F6BE37C3}" destId="{FB1CA0E9-11F8-499A-B0C1-F398DB9EF03A}" srcOrd="8" destOrd="0" presId="urn:microsoft.com/office/officeart/2005/8/layout/cycle8"/>
+    <dgm:cxn modelId="{5C3A0249-F19C-4490-A596-6645D6B851AC}" type="presParOf" srcId="{FC97EDF3-AE1C-4ECA-8381-4DC2F6BE37C3}" destId="{E4BD4BA9-58F6-47A4-A1AA-66E50DC3345C}" srcOrd="9" destOrd="0" presId="urn:microsoft.com/office/officeart/2005/8/layout/cycle8"/>
+    <dgm:cxn modelId="{ECF6B5DE-9F17-4CAA-B6A5-F5712B359768}" type="presParOf" srcId="{FC97EDF3-AE1C-4ECA-8381-4DC2F6BE37C3}" destId="{35A80986-AD35-42EC-B3BF-BEA0544DA6CB}" srcOrd="10" destOrd="0" presId="urn:microsoft.com/office/officeart/2005/8/layout/cycle8"/>
+    <dgm:cxn modelId="{99BFE2EE-D815-40EF-AE4F-6DB03FBF7703}" type="presParOf" srcId="{FC97EDF3-AE1C-4ECA-8381-4DC2F6BE37C3}" destId="{D74FD675-9A21-466D-B5B6-FED0A40247E4}" srcOrd="11" destOrd="0" presId="urn:microsoft.com/office/officeart/2005/8/layout/cycle8"/>
+    <dgm:cxn modelId="{A43D89C2-6F29-4BA6-A946-15CEEA614877}" type="presParOf" srcId="{FC97EDF3-AE1C-4ECA-8381-4DC2F6BE37C3}" destId="{60511FBD-357F-4A50-8EA6-B33481836715}" srcOrd="12" destOrd="0" presId="urn:microsoft.com/office/officeart/2005/8/layout/cycle8"/>
+    <dgm:cxn modelId="{B2C35957-F150-450D-9CDA-7B64230D8088}" type="presParOf" srcId="{FC97EDF3-AE1C-4ECA-8381-4DC2F6BE37C3}" destId="{E77950D8-7CB3-4BB9-A632-47D46EA67DFD}" srcOrd="13" destOrd="0" presId="urn:microsoft.com/office/officeart/2005/8/layout/cycle8"/>
+    <dgm:cxn modelId="{6FDC4028-5AE3-444A-8D41-7E1C1B0144F4}" type="presParOf" srcId="{FC97EDF3-AE1C-4ECA-8381-4DC2F6BE37C3}" destId="{8D76B93D-AD5C-46E6-AAF0-A4F43CFCCE71}" srcOrd="14" destOrd="0" presId="urn:microsoft.com/office/officeart/2005/8/layout/cycle8"/>
+    <dgm:cxn modelId="{3ECC83A4-6971-4EB6-BFA2-F2FEB18E88C0}" type="presParOf" srcId="{FC97EDF3-AE1C-4ECA-8381-4DC2F6BE37C3}" destId="{D599221A-A138-4CD6-A313-7C9BFEE0FF26}" srcOrd="15" destOrd="0" presId="urn:microsoft.com/office/officeart/2005/8/layout/cycle8"/>
+    <dgm:cxn modelId="{3943106F-DBA9-4F33-818E-ADDED3E24F26}" type="presParOf" srcId="{FC97EDF3-AE1C-4ECA-8381-4DC2F6BE37C3}" destId="{D3B58615-0FC7-42DD-81FB-11A2F978F79C}" srcOrd="16" destOrd="0" presId="urn:microsoft.com/office/officeart/2005/8/layout/cycle8"/>
+    <dgm:cxn modelId="{97F01773-2D06-426B-8790-EAA8CF07780D}" type="presParOf" srcId="{FC97EDF3-AE1C-4ECA-8381-4DC2F6BE37C3}" destId="{B67054D1-C4D4-4EF7-B6D0-BF3F53D1430D}" srcOrd="17" destOrd="0" presId="urn:microsoft.com/office/officeart/2005/8/layout/cycle8"/>
+    <dgm:cxn modelId="{B3408425-1084-4FA1-ABDA-312808020D94}" type="presParOf" srcId="{FC97EDF3-AE1C-4ECA-8381-4DC2F6BE37C3}" destId="{585FAA4C-B3BD-4FEC-8995-B3280C6F8996}" srcOrd="18" destOrd="0" presId="urn:microsoft.com/office/officeart/2005/8/layout/cycle8"/>
+    <dgm:cxn modelId="{C864EE72-3188-43DE-9335-35E8ED3D5F1D}" type="presParOf" srcId="{FC97EDF3-AE1C-4ECA-8381-4DC2F6BE37C3}" destId="{3F62D2A4-CA02-439F-A799-1A4AB377F075}" srcOrd="19" destOrd="0" presId="urn:microsoft.com/office/officeart/2005/8/layout/cycle8"/>
+    <dgm:cxn modelId="{87B79E5A-5E89-4FC6-AC3D-32EDC40809F9}" type="presParOf" srcId="{FC97EDF3-AE1C-4ECA-8381-4DC2F6BE37C3}" destId="{996FF857-F067-4447-96FC-75F83EF92294}" srcOrd="20" destOrd="0" presId="urn:microsoft.com/office/officeart/2005/8/layout/cycle8"/>
+    <dgm:cxn modelId="{C017B06F-9FB7-4499-B0B8-D4EE5028E963}" type="presParOf" srcId="{FC97EDF3-AE1C-4ECA-8381-4DC2F6BE37C3}" destId="{0BC62684-1807-46C2-B3DB-8068209CF78C}" srcOrd="21" destOrd="0" presId="urn:microsoft.com/office/officeart/2005/8/layout/cycle8"/>
+    <dgm:cxn modelId="{BB5624A0-D527-4253-810C-0B009B2218DE}" type="presParOf" srcId="{FC97EDF3-AE1C-4ECA-8381-4DC2F6BE37C3}" destId="{1696EFDF-5A2C-4B99-8582-303102DD17CF}" srcOrd="22" destOrd="0" presId="urn:microsoft.com/office/officeart/2005/8/layout/cycle8"/>
+    <dgm:cxn modelId="{ADB5D681-5871-4DEA-AC4C-4E3143026B65}" type="presParOf" srcId="{FC97EDF3-AE1C-4ECA-8381-4DC2F6BE37C3}" destId="{6034AE0E-874C-4500-8012-8719677D48D1}" srcOrd="23" destOrd="0" presId="urn:microsoft.com/office/officeart/2005/8/layout/cycle8"/>
+    <dgm:cxn modelId="{E4C763B7-8FA2-4CFE-8FF7-70422AD6C58B}" type="presParOf" srcId="{FC97EDF3-AE1C-4ECA-8381-4DC2F6BE37C3}" destId="{76911B7B-8C6D-42D0-92BD-4FB316B86F44}" srcOrd="24" destOrd="0" presId="urn:microsoft.com/office/officeart/2005/8/layout/cycle8"/>
+    <dgm:cxn modelId="{B70EF126-7A38-4499-B622-5A7872F3085A}" type="presParOf" srcId="{FC97EDF3-AE1C-4ECA-8381-4DC2F6BE37C3}" destId="{E6C7F39B-1696-4991-AF41-F9CA12606661}" srcOrd="25" destOrd="0" presId="urn:microsoft.com/office/officeart/2005/8/layout/cycle8"/>
+    <dgm:cxn modelId="{305506A0-37B9-412C-B140-8EBE16AEFC81}" type="presParOf" srcId="{FC97EDF3-AE1C-4ECA-8381-4DC2F6BE37C3}" destId="{48D3C65C-A506-49FE-AF78-E80DD9F4A033}" srcOrd="26" destOrd="0" presId="urn:microsoft.com/office/officeart/2005/8/layout/cycle8"/>
+    <dgm:cxn modelId="{42BD719F-782A-49A8-9713-A8E057D327B0}" type="presParOf" srcId="{FC97EDF3-AE1C-4ECA-8381-4DC2F6BE37C3}" destId="{D8CF0E5B-270E-4EAB-BC82-FA2FE2A19C2B}" srcOrd="27" destOrd="0" presId="urn:microsoft.com/office/officeart/2005/8/layout/cycle8"/>
+    <dgm:cxn modelId="{8E2AE12E-8F9C-4883-904F-1744113BDF09}" type="presParOf" srcId="{FC97EDF3-AE1C-4ECA-8381-4DC2F6BE37C3}" destId="{A219F2AD-F808-4AB2-8DBA-50B9995F6A6E}" srcOrd="28" destOrd="0" presId="urn:microsoft.com/office/officeart/2005/8/layout/cycle8"/>
+    <dgm:cxn modelId="{10873B49-E32F-4559-8AC0-1C90E57DD3EB}" type="presParOf" srcId="{FC97EDF3-AE1C-4ECA-8381-4DC2F6BE37C3}" destId="{8A45E0F2-BEE6-4E40-98B4-15B6C5A0EA89}" srcOrd="29" destOrd="0" presId="urn:microsoft.com/office/officeart/2005/8/layout/cycle8"/>
+    <dgm:cxn modelId="{D4CA8A76-428C-4E7C-BC2A-AB555F5D5298}" type="presParOf" srcId="{FC97EDF3-AE1C-4ECA-8381-4DC2F6BE37C3}" destId="{F9852ED8-5BD7-417C-AB31-9272F9B25397}" srcOrd="30" destOrd="0" presId="urn:microsoft.com/office/officeart/2005/8/layout/cycle8"/>
+    <dgm:cxn modelId="{023FC914-6918-46B8-9768-73896C5D4E89}" type="presParOf" srcId="{FC97EDF3-AE1C-4ECA-8381-4DC2F6BE37C3}" destId="{136E9AED-30C5-48AE-A67A-F1F72E5839A2}" srcOrd="31" destOrd="0" presId="urn:microsoft.com/office/officeart/2005/8/layout/cycle8"/>
+    <dgm:cxn modelId="{1A5F0A2A-96EF-48CC-9FFD-415807C922F4}" type="presParOf" srcId="{FC97EDF3-AE1C-4ECA-8381-4DC2F6BE37C3}" destId="{F10CA893-7B73-440F-A789-ED313064172D}" srcOrd="32" destOrd="0" presId="urn:microsoft.com/office/officeart/2005/8/layout/cycle8"/>
+    <dgm:cxn modelId="{CC24A8EA-CCA7-4925-97CB-625BEF1A1297}" type="presParOf" srcId="{FC97EDF3-AE1C-4ECA-8381-4DC2F6BE37C3}" destId="{C49DD70D-D344-49AF-B943-A31F48C81158}" srcOrd="33" destOrd="0" presId="urn:microsoft.com/office/officeart/2005/8/layout/cycle8"/>
+    <dgm:cxn modelId="{6FD0C173-9ACC-4733-94B3-07F55AA46676}" type="presParOf" srcId="{FC97EDF3-AE1C-4ECA-8381-4DC2F6BE37C3}" destId="{F0DF4F6F-DECC-4715-AA29-F8E444080957}" srcOrd="34" destOrd="0" presId="urn:microsoft.com/office/officeart/2005/8/layout/cycle8"/>
   </dgm:cxnLst>
   <dgm:bg/>
   <dgm:whole/>
@@ -17670,7 +17670,7 @@
               <a:buNone/>
             </a:pPr>
             <a:r>
-              <a:rPr lang="en-US" sz="4800">
+              <a:rPr lang="en-US" sz="4800" b="1" dirty="0">
                 <a:latin typeface="Times New Roman" panose="02020603050405020304" pitchFamily="18" charset="0"/>
                 <a:cs typeface="Times New Roman" panose="02020603050405020304" pitchFamily="18" charset="0"/>
               </a:rPr>
@@ -17682,21 +17682,21 @@
               <a:buNone/>
             </a:pPr>
             <a:r>
-              <a:rPr lang="en-US" sz="1600">
+              <a:rPr lang="en-US" sz="1600" dirty="0">
                 <a:latin typeface="Times New Roman" panose="02020603050405020304" pitchFamily="18" charset="0"/>
                 <a:cs typeface="Times New Roman" panose="02020603050405020304" pitchFamily="18" charset="0"/>
               </a:rPr>
               <a:t>Utili</a:t>
             </a:r>
             <a:r>
-              <a:rPr lang="de-DE" sz="1600">
+              <a:rPr lang="de-DE" sz="1600" dirty="0">
                 <a:latin typeface="Times New Roman" panose="02020603050405020304" pitchFamily="18" charset="0"/>
                 <a:cs typeface="Times New Roman" panose="02020603050405020304" pitchFamily="18" charset="0"/>
               </a:rPr>
               <a:t>z</a:t>
             </a:r>
             <a:r>
-              <a:rPr lang="en-US" sz="1600">
+              <a:rPr lang="en-US" sz="1600" dirty="0">
                 <a:latin typeface="Times New Roman" panose="02020603050405020304" pitchFamily="18" charset="0"/>
                 <a:cs typeface="Times New Roman" panose="02020603050405020304" pitchFamily="18" charset="0"/>
               </a:rPr>
@@ -17724,7 +17724,13 @@
             </a:extLst>
           </p:cNvPr>
           <p:cNvGraphicFramePr/>
-          <p:nvPr/>
+          <p:nvPr>
+            <p:extLst>
+              <p:ext uri="{D42A27DB-BD31-4B8C-83A1-F6EECF244321}">
+                <p14:modId xmlns:p14="http://schemas.microsoft.com/office/powerpoint/2010/main" val="2987776486"/>
+              </p:ext>
+            </p:extLst>
+          </p:nvPr>
         </p:nvGraphicFramePr>
         <p:xfrm>
           <a:off x="2306319" y="2981960"/>
@@ -17840,9 +17846,11 @@
           </a:bodyPr>
           <a:lstStyle/>
           <a:p>
-            <a:pPr algn="just"/>
+            <a:pPr marL="0" indent="0" algn="just">
+              <a:buNone/>
+            </a:pPr>
             <a:r>
-              <a:rPr lang="en-US" sz="1800" b="0" i="0">
+              <a:rPr lang="en-US" sz="1800" b="0" i="0" dirty="0">
                 <a:solidFill>
                   <a:srgbClr val="0D0D0D"/>
                 </a:solidFill>
@@ -17850,7 +17858,29 @@
                 <a:latin typeface="Times New Roman" panose="02020603050405020304" pitchFamily="18" charset="0"/>
                 <a:cs typeface="Times New Roman" panose="02020603050405020304" pitchFamily="18" charset="0"/>
               </a:rPr>
-              <a:t>User Equipment (UE) encompasses all devices utilized by end-users to access mobile networks, including smartphones, tablets, and IoT devices, especially in the context of 5G. These devices support the advanced capabilities of 5G, such as enhanced data rates, low latency, and increased connectivity options. UEs are crucial for leveraging 5G's potential, facilitating a wide range of applications from streaming to smart cities. They are designed to operate across various frequencies, including mmWave, ensuring wide coverage and high-speed connectivity. The development of UE continues to evolve, focusing on improving performance, energy efficiency, and security to meet the growing demands of 5G networks.</a:t>
+              <a:t>User Equipment (UE) encompasses all devices utilized by end-users to access mobile networks, including smartphones, tablets, and IoT devices, especially in the context of 5G. These devices support the advanced capabilities of 5G, such as enhanced data rates, low latency, and increased connectivity options. UEs are crucial for leveraging 5G's potential, facilitating a wide range of applications from streaming to smart cities. They are designed to operate across various frequencies, including </a:t>
+            </a:r>
+            <a:r>
+              <a:rPr lang="en-US" sz="1800" b="0" i="0" dirty="0" err="1">
+                <a:solidFill>
+                  <a:srgbClr val="0D0D0D"/>
+                </a:solidFill>
+                <a:effectLst/>
+                <a:latin typeface="Times New Roman" panose="02020603050405020304" pitchFamily="18" charset="0"/>
+                <a:cs typeface="Times New Roman" panose="02020603050405020304" pitchFamily="18" charset="0"/>
+              </a:rPr>
+              <a:t>mmWave</a:t>
+            </a:r>
+            <a:r>
+              <a:rPr lang="en-US" sz="1800" b="0" i="0" dirty="0">
+                <a:solidFill>
+                  <a:srgbClr val="0D0D0D"/>
+                </a:solidFill>
+                <a:effectLst/>
+                <a:latin typeface="Times New Roman" panose="02020603050405020304" pitchFamily="18" charset="0"/>
+                <a:cs typeface="Times New Roman" panose="02020603050405020304" pitchFamily="18" charset="0"/>
+              </a:rPr>
+              <a:t>, ensuring wide coverage and high-speed connectivity. The development of UE continues to evolve, focusing on improving performance, energy efficiency, and security to meet the growing demands of 5G networks.</a:t>
             </a:r>
             <a:endParaRPr lang="de-DE" sz="1800" dirty="0">
               <a:latin typeface="Times New Roman" panose="02020603050405020304" pitchFamily="18" charset="0"/>
@@ -18062,8 +18092,8 @@
         </p:nvSpPr>
         <p:spPr>
           <a:xfrm>
-            <a:off x="411480" y="991443"/>
-            <a:ext cx="4443154" cy="1087819"/>
+            <a:off x="411480" y="717123"/>
+            <a:ext cx="4443154" cy="832517"/>
           </a:xfrm>
         </p:spPr>
         <p:txBody>
@@ -18237,7 +18267,7 @@
         </p:nvSpPr>
         <p:spPr>
           <a:xfrm>
-            <a:off x="411480" y="2303829"/>
+            <a:off x="411479" y="1938079"/>
             <a:ext cx="4443154" cy="3873134"/>
           </a:xfrm>
         </p:spPr>
@@ -20435,7 +20465,7 @@
               <a:buNone/>
             </a:pPr>
             <a:r>
-              <a:rPr lang="en-US" sz="2000" b="1" i="0">
+              <a:rPr lang="en-US" sz="2000" b="1" i="0" dirty="0">
                 <a:effectLst/>
                 <a:latin typeface="Times New Roman" panose="02020603050405020304" pitchFamily="18" charset="0"/>
                 <a:cs typeface="Times New Roman" panose="02020603050405020304" pitchFamily="18" charset="0"/>
@@ -20443,7 +20473,7 @@
               <a:t>5. Network Slice Selection Function (NSSF)</a:t>
             </a:r>
             <a:r>
-              <a:rPr lang="en-US" sz="2000" b="0" i="0">
+              <a:rPr lang="en-US" sz="2000" b="0" i="0" dirty="0">
                 <a:effectLst/>
                 <a:latin typeface="Times New Roman" panose="02020603050405020304" pitchFamily="18" charset="0"/>
                 <a:cs typeface="Times New Roman" panose="02020603050405020304" pitchFamily="18" charset="0"/>
@@ -20456,7 +20486,7 @@
               <a:buNone/>
             </a:pPr>
             <a:r>
-              <a:rPr lang="en-US" sz="2000" b="1" i="0">
+              <a:rPr lang="en-US" sz="2000" b="1" i="0" dirty="0">
                 <a:effectLst/>
                 <a:latin typeface="Times New Roman" panose="02020603050405020304" pitchFamily="18" charset="0"/>
                 <a:cs typeface="Times New Roman" panose="02020603050405020304" pitchFamily="18" charset="0"/>
@@ -20464,7 +20494,7 @@
               <a:t>6. Network Exposure Function (NEF)</a:t>
             </a:r>
             <a:r>
-              <a:rPr lang="en-US" sz="2000" b="0" i="0">
+              <a:rPr lang="en-US" sz="2000" b="0" i="0" dirty="0">
                 <a:effectLst/>
                 <a:latin typeface="Times New Roman" panose="02020603050405020304" pitchFamily="18" charset="0"/>
                 <a:cs typeface="Times New Roman" panose="02020603050405020304" pitchFamily="18" charset="0"/>
@@ -20477,14 +20507,21 @@
               <a:buNone/>
             </a:pPr>
             <a:r>
-              <a:rPr lang="en-US" sz="2000">
+              <a:rPr lang="en-US" sz="2000" b="1" dirty="0">
                 <a:latin typeface="Times New Roman" panose="02020603050405020304" pitchFamily="18" charset="0"/>
                 <a:cs typeface="Times New Roman" panose="02020603050405020304" pitchFamily="18" charset="0"/>
               </a:rPr>
-              <a:t>7. </a:t>
+              <a:t>7</a:t>
             </a:r>
             <a:r>
-              <a:rPr lang="en-US" sz="2000" b="1" i="0">
+              <a:rPr lang="en-US" sz="2000" dirty="0">
+                <a:latin typeface="Times New Roman" panose="02020603050405020304" pitchFamily="18" charset="0"/>
+                <a:cs typeface="Times New Roman" panose="02020603050405020304" pitchFamily="18" charset="0"/>
+              </a:rPr>
+              <a:t>. </a:t>
+            </a:r>
+            <a:r>
+              <a:rPr lang="en-US" sz="2000" b="1" i="0" dirty="0">
                 <a:effectLst/>
                 <a:latin typeface="Times New Roman" panose="02020603050405020304" pitchFamily="18" charset="0"/>
                 <a:cs typeface="Times New Roman" panose="02020603050405020304" pitchFamily="18" charset="0"/>
@@ -20492,7 +20529,7 @@
               <a:t>Authentication Server Function (AUSF)</a:t>
             </a:r>
             <a:r>
-              <a:rPr lang="en-US" sz="2000" b="0" i="0">
+              <a:rPr lang="en-US" sz="2000" b="0" i="0" dirty="0">
                 <a:effectLst/>
                 <a:latin typeface="Times New Roman" panose="02020603050405020304" pitchFamily="18" charset="0"/>
                 <a:cs typeface="Times New Roman" panose="02020603050405020304" pitchFamily="18" charset="0"/>
@@ -20504,7 +20541,7 @@
             <a:pPr marL="0" indent="0">
               <a:buNone/>
             </a:pPr>
-            <a:endParaRPr lang="de-DE" sz="2000">
+            <a:endParaRPr lang="de-DE" sz="2000" dirty="0">
               <a:latin typeface="Times New Roman" panose="02020603050405020304" pitchFamily="18" charset="0"/>
               <a:cs typeface="Times New Roman" panose="02020603050405020304" pitchFamily="18" charset="0"/>
             </a:endParaRPr>
@@ -21108,7 +21145,7 @@
         </p:nvSpPr>
         <p:spPr>
           <a:xfrm>
-            <a:off x="5434149" y="932688"/>
+            <a:off x="5440679" y="928116"/>
             <a:ext cx="5916603" cy="4992624"/>
           </a:xfrm>
         </p:spPr>
@@ -21122,14 +21159,14 @@
               <a:buNone/>
             </a:pPr>
             <a:r>
-              <a:rPr lang="en-US" sz="1900" b="1">
+              <a:rPr lang="en-US" sz="1900" b="1" dirty="0">
                 <a:latin typeface="Times New Roman" panose="02020603050405020304" pitchFamily="18" charset="0"/>
                 <a:cs typeface="Times New Roman" panose="02020603050405020304" pitchFamily="18" charset="0"/>
               </a:rPr>
               <a:t>8. </a:t>
             </a:r>
             <a:r>
-              <a:rPr lang="de-DE" sz="1900" b="1" i="0">
+              <a:rPr lang="de-DE" sz="1900" b="1" i="0" dirty="0">
                 <a:effectLst/>
                 <a:latin typeface="Times New Roman" panose="02020603050405020304" pitchFamily="18" charset="0"/>
                 <a:cs typeface="Times New Roman" panose="02020603050405020304" pitchFamily="18" charset="0"/>
@@ -21137,13 +21174,13 @@
               <a:t>Unified Data Management (UDM): </a:t>
             </a:r>
             <a:r>
-              <a:rPr lang="en-US" sz="1900" b="0" i="0">
+              <a:rPr lang="en-US" sz="1900" b="0" i="0" dirty="0">
                 <a:effectLst/>
                 <a:latin typeface="-apple-system"/>
               </a:rPr>
               <a:t>The Unified Data Management is a crucial element in the 5G network architecture responsible for managing subscriber-related data. It centralizes and securely stores essential information about users, including authentication credentials, subscription details, and service profiles. The UDM plays a vital role in authenticating users and authorizing their access to network resources, ensuring the security and integrity of the 5G network.</a:t>
             </a:r>
-            <a:endParaRPr lang="de-DE" sz="1900" b="1" i="0">
+            <a:endParaRPr lang="de-DE" sz="1900" b="1" i="0" dirty="0">
               <a:effectLst/>
               <a:latin typeface="-apple-system"/>
             </a:endParaRPr>
@@ -21152,7 +21189,7 @@
             <a:pPr marL="0" indent="0">
               <a:buNone/>
             </a:pPr>
-            <a:endParaRPr lang="de-DE" sz="1900">
+            <a:endParaRPr lang="de-DE" sz="1900" dirty="0">
               <a:latin typeface="Times New Roman" panose="02020603050405020304" pitchFamily="18" charset="0"/>
               <a:cs typeface="Times New Roman" panose="02020603050405020304" pitchFamily="18" charset="0"/>
             </a:endParaRPr>
@@ -21162,27 +21199,34 @@
               <a:buNone/>
             </a:pPr>
             <a:r>
-              <a:rPr lang="de-DE" sz="1900">
+              <a:rPr lang="de-DE" sz="1900" b="1" dirty="0">
                 <a:latin typeface="Times New Roman" panose="02020603050405020304" pitchFamily="18" charset="0"/>
                 <a:cs typeface="Times New Roman" panose="02020603050405020304" pitchFamily="18" charset="0"/>
               </a:rPr>
-              <a:t>9. </a:t>
+              <a:t>9</a:t>
             </a:r>
             <a:r>
-              <a:rPr lang="de-DE" sz="1900" b="1">
+              <a:rPr lang="de-DE" sz="1900" dirty="0">
+                <a:latin typeface="Times New Roman" panose="02020603050405020304" pitchFamily="18" charset="0"/>
+                <a:cs typeface="Times New Roman" panose="02020603050405020304" pitchFamily="18" charset="0"/>
+              </a:rPr>
+              <a:t>. </a:t>
+            </a:r>
+            <a:r>
+              <a:rPr lang="de-DE" sz="1900" b="1" dirty="0">
                 <a:latin typeface="Times New Roman" panose="02020603050405020304" pitchFamily="18" charset="0"/>
                 <a:cs typeface="Times New Roman" panose="02020603050405020304" pitchFamily="18" charset="0"/>
               </a:rPr>
               <a:t>Unified Data Repository (UDR): </a:t>
             </a:r>
             <a:r>
-              <a:rPr lang="en-US" sz="1900" b="0" i="0">
+              <a:rPr lang="en-US" sz="1900" b="0" i="0" dirty="0">
                 <a:effectLst/>
                 <a:latin typeface="-apple-system"/>
               </a:rPr>
               <a:t>The Unified Data Repository is a critical component within the 5G network architecture, dedicated to storing and managing user data. Specifically, the UDR focuses on handling dynamic user-related data, such as session-specific information, usage statistics, and contextual data relevant to ongoing connections.</a:t>
             </a:r>
-            <a:endParaRPr lang="de-DE" sz="1900" b="1">
+            <a:endParaRPr lang="de-DE" sz="1900" b="1" dirty="0">
               <a:latin typeface="Times New Roman" panose="02020603050405020304" pitchFamily="18" charset="0"/>
               <a:cs typeface="Times New Roman" panose="02020603050405020304" pitchFamily="18" charset="0"/>
             </a:endParaRPr>
@@ -21616,7 +21660,7 @@
           </a:bodyPr>
           <a:lstStyle/>
           <a:p>
-            <a:endParaRPr lang="en-US" sz="2400" b="0" i="0">
+            <a:endParaRPr lang="en-US" sz="2400" b="0" i="0" dirty="0">
               <a:solidFill>
                 <a:srgbClr val="0D0D0D"/>
               </a:solidFill>
@@ -21627,7 +21671,7 @@
           </a:p>
           <a:p>
             <a:r>
-              <a:rPr lang="en-US" sz="2000" b="1" i="0">
+              <a:rPr lang="en-US" sz="2000" b="1" i="0" dirty="0">
                 <a:solidFill>
                   <a:srgbClr val="0D0D0D"/>
                 </a:solidFill>
@@ -21638,7 +21682,7 @@
               <a:t>Open-Source Framework</a:t>
             </a:r>
             <a:r>
-              <a:rPr lang="en-US" sz="2000" b="0" i="0">
+              <a:rPr lang="en-US" sz="2000" b="0" i="0" dirty="0">
                 <a:solidFill>
                   <a:srgbClr val="0D0D0D"/>
                 </a:solidFill>
@@ -21648,7 +21692,7 @@
               </a:rPr>
               <a:t>: Open5GS is a pioneering open-source project aimed at implementing core network functions for 5G and 4G (LTE) networks.</a:t>
             </a:r>
-            <a:endParaRPr lang="en-US" sz="2000">
+            <a:endParaRPr lang="en-US" sz="2000" dirty="0">
               <a:solidFill>
                 <a:srgbClr val="0D0D0D"/>
               </a:solidFill>
@@ -21658,29 +21702,31 @@
           </a:p>
           <a:p>
             <a:r>
-              <a:rPr lang="en-US" sz="2000" b="1" i="0">
+              <a:rPr lang="en-US" sz="2000" b="1" i="0" dirty="0">
                 <a:solidFill>
                   <a:srgbClr val="0D0D0D"/>
                 </a:solidFill>
                 <a:effectLst/>
-                <a:latin typeface="Söhne"/>
+                <a:latin typeface="Times New Roman" panose="02020603050405020304" pitchFamily="18" charset="0"/>
+                <a:cs typeface="Times New Roman" panose="02020603050405020304" pitchFamily="18" charset="0"/>
               </a:rPr>
               <a:t>Facilitating 5G R&amp;D</a:t>
             </a:r>
             <a:r>
-              <a:rPr lang="en-US" sz="2000" b="0" i="0">
+              <a:rPr lang="en-US" sz="2000" b="0" i="0" dirty="0">
                 <a:solidFill>
                   <a:srgbClr val="0D0D0D"/>
                 </a:solidFill>
                 <a:effectLst/>
-                <a:latin typeface="Söhne"/>
+                <a:latin typeface="Times New Roman" panose="02020603050405020304" pitchFamily="18" charset="0"/>
+                <a:cs typeface="Times New Roman" panose="02020603050405020304" pitchFamily="18" charset="0"/>
               </a:rPr>
               <a:t>: Provides a comprehensive framework for deploying a fully operational core network, crucial for the research, development, and testing of 5G technologies.</a:t>
             </a:r>
           </a:p>
           <a:p>
             <a:r>
-              <a:rPr lang="en-US" sz="2000" b="1" i="0">
+              <a:rPr lang="en-US" sz="2000" b="1" i="0" dirty="0">
                 <a:solidFill>
                   <a:srgbClr val="0D0D0D"/>
                 </a:solidFill>
@@ -21691,7 +21737,7 @@
               <a:t>Enabling Flexibility</a:t>
             </a:r>
             <a:r>
-              <a:rPr lang="en-US" sz="2000" b="0" i="0">
+              <a:rPr lang="en-US" sz="2000" b="0" i="0" dirty="0">
                 <a:solidFill>
                   <a:srgbClr val="0D0D0D"/>
                 </a:solidFill>
@@ -21704,7 +21750,7 @@
           </a:p>
           <a:p>
             <a:r>
-              <a:rPr lang="en-US" sz="2000" b="1" i="0">
+              <a:rPr lang="en-US" sz="2000" b="1" i="0" dirty="0">
                 <a:solidFill>
                   <a:srgbClr val="0D0D0D"/>
                 </a:solidFill>
@@ -21715,7 +21761,7 @@
               <a:t>Scalability</a:t>
             </a:r>
             <a:r>
-              <a:rPr lang="en-US" sz="2000" b="0" i="0">
+              <a:rPr lang="en-US" sz="2000" b="0" i="0" dirty="0">
                 <a:solidFill>
                   <a:srgbClr val="0D0D0D"/>
                 </a:solidFill>
@@ -22971,10 +23017,10 @@
       </p:grpSpPr>
       <p:sp useBgFill="1">
         <p:nvSpPr>
-          <p:cNvPr id="12" name="Rectangle 11">
+          <p:cNvPr id="38" name="Rectangle 37">
             <a:extLst>
               <a:ext uri="{FF2B5EF4-FFF2-40B4-BE49-F238E27FC236}">
-                <a16:creationId xmlns:a16="http://schemas.microsoft.com/office/drawing/2014/main" id="{777A147A-9ED8-46B4-8660-1B3C2AA880B5}"/>
+                <a16:creationId xmlns:a16="http://schemas.microsoft.com/office/drawing/2014/main" id="{1C799903-48D5-4A31-A1A2-541072D9771E}"/>
               </a:ext>
               <a:ext uri="{C183D7F6-B498-43B3-948B-1728B52AA6E4}">
                 <adec:decorative xmlns:adec="http://schemas.microsoft.com/office/drawing/2017/decorative" val="1"/>
@@ -22995,7 +23041,7 @@
         <p:spPr>
           <a:xfrm>
             <a:off x="0" y="0"/>
-            <a:ext cx="12188952" cy="6858000"/>
+            <a:ext cx="12192002" cy="6858000"/>
           </a:xfrm>
           <a:prstGeom prst="rect">
             <a:avLst/>
@@ -23029,54 +23075,12 @@
           </a:p>
         </p:txBody>
       </p:sp>
-      <p:sp>
+      <p:sp useBgFill="1">
         <p:nvSpPr>
-          <p:cNvPr id="7" name="Title 6">
+          <p:cNvPr id="39" name="Freeform: Shape 32">
             <a:extLst>
               <a:ext uri="{FF2B5EF4-FFF2-40B4-BE49-F238E27FC236}">
-                <a16:creationId xmlns:a16="http://schemas.microsoft.com/office/drawing/2014/main" id="{C450EE17-B052-0F29-575F-B095B42F1C9D}"/>
-              </a:ext>
-            </a:extLst>
-          </p:cNvPr>
-          <p:cNvSpPr>
-            <a:spLocks noGrp="1"/>
-          </p:cNvSpPr>
-          <p:nvPr>
-            <p:ph type="title"/>
-          </p:nvPr>
-        </p:nvSpPr>
-        <p:spPr>
-          <a:xfrm>
-            <a:off x="841248" y="548640"/>
-            <a:ext cx="3600860" cy="5431536"/>
-          </a:xfrm>
-        </p:spPr>
-        <p:txBody>
-          <a:bodyPr>
-            <a:normAutofit/>
-          </a:bodyPr>
-          <a:lstStyle/>
-          <a:p>
-            <a:r>
-              <a:rPr lang="en-US" sz="5400" dirty="0">
-                <a:latin typeface="Times New Roman" panose="02020603050405020304" pitchFamily="18" charset="0"/>
-                <a:cs typeface="Times New Roman" panose="02020603050405020304" pitchFamily="18" charset="0"/>
-              </a:rPr>
-              <a:t>Contents</a:t>
-            </a:r>
-            <a:br>
-              <a:rPr lang="en-US" sz="5400" dirty="0"/>
-            </a:br>
-            <a:endParaRPr lang="de-DE" sz="5400" dirty="0"/>
-          </a:p>
-        </p:txBody>
-      </p:sp>
-      <p:sp>
-        <p:nvSpPr>
-          <p:cNvPr id="14" name="sketch line">
-            <a:extLst>
-              <a:ext uri="{FF2B5EF4-FFF2-40B4-BE49-F238E27FC236}">
-                <a16:creationId xmlns:a16="http://schemas.microsoft.com/office/drawing/2014/main" id="{5D6C15A0-C087-4593-8414-2B4EC1CDC3DE}"/>
+                <a16:creationId xmlns:a16="http://schemas.microsoft.com/office/drawing/2014/main" id="{8EFFF109-FC58-4FD3-BE05-9775A1310F55}"/>
               </a:ext>
               <a:ext uri="{C183D7F6-B498-43B3-948B-1728B52AA6E4}">
                 <adec:decorative xmlns:adec="http://schemas.microsoft.com/office/drawing/2017/decorative" val="1"/>
@@ -23095,47 +23099,27 @@
           </p:nvPr>
         </p:nvSpPr>
         <p:spPr>
-          <a:xfrm rot="5400000">
-            <a:off x="2543983" y="3258715"/>
-            <a:ext cx="4480560" cy="18288"/>
+          <a:xfrm>
+            <a:off x="-1" y="0"/>
+            <a:ext cx="4818889" cy="6858000"/>
           </a:xfrm>
           <a:custGeom>
             <a:avLst/>
             <a:gdLst>
-              <a:gd name="connsiteX0" fmla="*/ 0 w 4480560"/>
-              <a:gd name="connsiteY0" fmla="*/ 0 h 18288"/>
-              <a:gd name="connsiteX1" fmla="*/ 595274 w 4480560"/>
-              <a:gd name="connsiteY1" fmla="*/ 0 h 18288"/>
-              <a:gd name="connsiteX2" fmla="*/ 1100938 w 4480560"/>
-              <a:gd name="connsiteY2" fmla="*/ 0 h 18288"/>
-              <a:gd name="connsiteX3" fmla="*/ 1651406 w 4480560"/>
-              <a:gd name="connsiteY3" fmla="*/ 0 h 18288"/>
-              <a:gd name="connsiteX4" fmla="*/ 2336292 w 4480560"/>
-              <a:gd name="connsiteY4" fmla="*/ 0 h 18288"/>
-              <a:gd name="connsiteX5" fmla="*/ 2931566 w 4480560"/>
-              <a:gd name="connsiteY5" fmla="*/ 0 h 18288"/>
-              <a:gd name="connsiteX6" fmla="*/ 3482035 w 4480560"/>
-              <a:gd name="connsiteY6" fmla="*/ 0 h 18288"/>
-              <a:gd name="connsiteX7" fmla="*/ 4480560 w 4480560"/>
-              <a:gd name="connsiteY7" fmla="*/ 0 h 18288"/>
-              <a:gd name="connsiteX8" fmla="*/ 4480560 w 4480560"/>
-              <a:gd name="connsiteY8" fmla="*/ 18288 h 18288"/>
-              <a:gd name="connsiteX9" fmla="*/ 3840480 w 4480560"/>
-              <a:gd name="connsiteY9" fmla="*/ 18288 h 18288"/>
-              <a:gd name="connsiteX10" fmla="*/ 3290011 w 4480560"/>
-              <a:gd name="connsiteY10" fmla="*/ 18288 h 18288"/>
-              <a:gd name="connsiteX11" fmla="*/ 2560320 w 4480560"/>
-              <a:gd name="connsiteY11" fmla="*/ 18288 h 18288"/>
-              <a:gd name="connsiteX12" fmla="*/ 1965046 w 4480560"/>
-              <a:gd name="connsiteY12" fmla="*/ 18288 h 18288"/>
-              <a:gd name="connsiteX13" fmla="*/ 1459382 w 4480560"/>
-              <a:gd name="connsiteY13" fmla="*/ 18288 h 18288"/>
-              <a:gd name="connsiteX14" fmla="*/ 774497 w 4480560"/>
-              <a:gd name="connsiteY14" fmla="*/ 18288 h 18288"/>
-              <a:gd name="connsiteX15" fmla="*/ 0 w 4480560"/>
-              <a:gd name="connsiteY15" fmla="*/ 18288 h 18288"/>
-              <a:gd name="connsiteX16" fmla="*/ 0 w 4480560"/>
-              <a:gd name="connsiteY16" fmla="*/ 0 h 18288"/>
+              <a:gd name="connsiteX0" fmla="*/ 0 w 4818889"/>
+              <a:gd name="connsiteY0" fmla="*/ 0 h 6858000"/>
+              <a:gd name="connsiteX1" fmla="*/ 3605911 w 4818889"/>
+              <a:gd name="connsiteY1" fmla="*/ 0 h 6858000"/>
+              <a:gd name="connsiteX2" fmla="*/ 3668894 w 4818889"/>
+              <a:gd name="connsiteY2" fmla="*/ 69271 h 6858000"/>
+              <a:gd name="connsiteX3" fmla="*/ 4818889 w 4818889"/>
+              <a:gd name="connsiteY3" fmla="*/ 3429000 h 6858000"/>
+              <a:gd name="connsiteX4" fmla="*/ 3668894 w 4818889"/>
+              <a:gd name="connsiteY4" fmla="*/ 6788730 h 6858000"/>
+              <a:gd name="connsiteX5" fmla="*/ 3605911 w 4818889"/>
+              <a:gd name="connsiteY5" fmla="*/ 6858000 h 6858000"/>
+              <a:gd name="connsiteX6" fmla="*/ 0 w 4818889"/>
+              <a:gd name="connsiteY6" fmla="*/ 6858000 h 6858000"/>
             </a:gdLst>
             <a:ahLst/>
             <a:cxnLst>
@@ -23160,233 +23144,350 @@
               <a:cxn ang="0">
                 <a:pos x="connsiteX6" y="connsiteY6"/>
               </a:cxn>
+            </a:cxnLst>
+            <a:rect l="l" t="t" r="r" b="b"/>
+            <a:pathLst>
+              <a:path w="4818889" h="6858000">
+                <a:moveTo>
+                  <a:pt x="0" y="0"/>
+                </a:moveTo>
+                <a:lnTo>
+                  <a:pt x="3605911" y="0"/>
+                </a:lnTo>
+                <a:lnTo>
+                  <a:pt x="3668894" y="69271"/>
+                </a:lnTo>
+                <a:cubicBezTo>
+                  <a:pt x="4379420" y="929100"/>
+                  <a:pt x="4818889" y="2116944"/>
+                  <a:pt x="4818889" y="3429000"/>
+                </a:cubicBezTo>
+                <a:cubicBezTo>
+                  <a:pt x="4818889" y="4741056"/>
+                  <a:pt x="4379420" y="5928900"/>
+                  <a:pt x="3668894" y="6788730"/>
+                </a:cubicBezTo>
+                <a:lnTo>
+                  <a:pt x="3605911" y="6858000"/>
+                </a:lnTo>
+                <a:lnTo>
+                  <a:pt x="0" y="6858000"/>
+                </a:lnTo>
+                <a:close/>
+              </a:path>
+            </a:pathLst>
+          </a:custGeom>
+          <a:ln w="9525">
+            <a:solidFill>
+              <a:srgbClr val="E6E6E6"/>
+            </a:solidFill>
+          </a:ln>
+          <a:effectLst>
+            <a:outerShdw blurRad="50800" dist="38100" algn="l" rotWithShape="0">
+              <a:schemeClr val="bg1">
+                <a:lumMod val="85000"/>
+                <a:alpha val="50000"/>
+              </a:schemeClr>
+            </a:outerShdw>
+          </a:effectLst>
+        </p:spPr>
+        <p:style>
+          <a:lnRef idx="2">
+            <a:schemeClr val="accent1">
+              <a:shade val="50000"/>
+            </a:schemeClr>
+          </a:lnRef>
+          <a:fillRef idx="1">
+            <a:schemeClr val="accent1"/>
+          </a:fillRef>
+          <a:effectRef idx="0">
+            <a:schemeClr val="accent1"/>
+          </a:effectRef>
+          <a:fontRef idx="minor">
+            <a:schemeClr val="lt1"/>
+          </a:fontRef>
+        </p:style>
+        <p:txBody>
+          <a:bodyPr wrap="square" rtlCol="0" anchor="ctr">
+            <a:noAutofit/>
+          </a:bodyPr>
+          <a:lstStyle/>
+          <a:p>
+            <a:pPr marL="0" marR="0" lvl="0" indent="0" algn="ctr" defTabSz="914400" rtl="0" eaLnBrk="1" fontAlgn="auto" latinLnBrk="0" hangingPunct="1">
+              <a:lnSpc>
+                <a:spcPct val="100000"/>
+              </a:lnSpc>
+              <a:spcBef>
+                <a:spcPts val="0"/>
+              </a:spcBef>
+              <a:spcAft>
+                <a:spcPts val="0"/>
+              </a:spcAft>
+              <a:buClrTx/>
+              <a:buSzTx/>
+              <a:buFontTx/>
+              <a:buNone/>
+              <a:tabLst/>
+              <a:defRPr/>
+            </a:pPr>
+            <a:endParaRPr kumimoji="0" lang="en-US" sz="1800" b="0" i="0" u="none" strike="noStrike" kern="1200" cap="none" spc="0" normalizeH="0" baseline="0" noProof="0">
+              <a:ln>
+                <a:noFill/>
+              </a:ln>
+              <a:solidFill>
+                <a:prstClr val="white"/>
+              </a:solidFill>
+              <a:effectLst/>
+              <a:uLnTx/>
+              <a:uFillTx/>
+              <a:latin typeface="Calibri" panose="020F0502020204030204"/>
+              <a:ea typeface="+mn-ea"/>
+              <a:cs typeface="+mn-cs"/>
+            </a:endParaRPr>
+          </a:p>
+        </p:txBody>
+      </p:sp>
+      <p:sp useBgFill="1">
+        <p:nvSpPr>
+          <p:cNvPr id="40" name="Freeform: Shape 34">
+            <a:extLst>
+              <a:ext uri="{FF2B5EF4-FFF2-40B4-BE49-F238E27FC236}">
+                <a16:creationId xmlns:a16="http://schemas.microsoft.com/office/drawing/2014/main" id="{E1B96AD6-92A9-4273-A62B-96A1C3E0BA95}"/>
+              </a:ext>
+              <a:ext uri="{C183D7F6-B498-43B3-948B-1728B52AA6E4}">
+                <adec:decorative xmlns:adec="http://schemas.microsoft.com/office/drawing/2017/decorative" val="1"/>
+              </a:ext>
+            </a:extLst>
+          </p:cNvPr>
+          <p:cNvSpPr>
+            <a:spLocks noGrp="1" noRot="1" noChangeAspect="1" noMove="1" noResize="1" noEditPoints="1" noAdjustHandles="1" noChangeArrowheads="1" noChangeShapeType="1" noTextEdit="1"/>
+          </p:cNvSpPr>
+          <p:nvPr>
+            <p:extLst>
+              <p:ext uri="{386F3935-93C4-4BCD-93E2-E3B085C9AB24}">
+                <p16:designElem xmlns:p16="http://schemas.microsoft.com/office/powerpoint/2015/main" val="1"/>
+              </p:ext>
+            </p:extLst>
+          </p:nvPr>
+        </p:nvSpPr>
+        <p:spPr>
+          <a:xfrm>
+            <a:off x="1" y="0"/>
+            <a:ext cx="4811477" cy="6858000"/>
+          </a:xfrm>
+          <a:custGeom>
+            <a:avLst/>
+            <a:gdLst>
+              <a:gd name="connsiteX0" fmla="*/ 0 w 4811477"/>
+              <a:gd name="connsiteY0" fmla="*/ 0 h 6858000"/>
+              <a:gd name="connsiteX1" fmla="*/ 3598499 w 4811477"/>
+              <a:gd name="connsiteY1" fmla="*/ 0 h 6858000"/>
+              <a:gd name="connsiteX2" fmla="*/ 3661482 w 4811477"/>
+              <a:gd name="connsiteY2" fmla="*/ 69271 h 6858000"/>
+              <a:gd name="connsiteX3" fmla="*/ 4811477 w 4811477"/>
+              <a:gd name="connsiteY3" fmla="*/ 3429000 h 6858000"/>
+              <a:gd name="connsiteX4" fmla="*/ 3661482 w 4811477"/>
+              <a:gd name="connsiteY4" fmla="*/ 6788730 h 6858000"/>
+              <a:gd name="connsiteX5" fmla="*/ 3598499 w 4811477"/>
+              <a:gd name="connsiteY5" fmla="*/ 6858000 h 6858000"/>
+              <a:gd name="connsiteX6" fmla="*/ 0 w 4811477"/>
+              <a:gd name="connsiteY6" fmla="*/ 6858000 h 6858000"/>
+            </a:gdLst>
+            <a:ahLst/>
+            <a:cxnLst>
               <a:cxn ang="0">
-                <a:pos x="connsiteX7" y="connsiteY7"/>
+                <a:pos x="connsiteX0" y="connsiteY0"/>
               </a:cxn>
               <a:cxn ang="0">
-                <a:pos x="connsiteX8" y="connsiteY8"/>
+                <a:pos x="connsiteX1" y="connsiteY1"/>
               </a:cxn>
               <a:cxn ang="0">
-                <a:pos x="connsiteX9" y="connsiteY9"/>
+                <a:pos x="connsiteX2" y="connsiteY2"/>
               </a:cxn>
               <a:cxn ang="0">
-                <a:pos x="connsiteX10" y="connsiteY10"/>
+                <a:pos x="connsiteX3" y="connsiteY3"/>
               </a:cxn>
               <a:cxn ang="0">
-                <a:pos x="connsiteX11" y="connsiteY11"/>
+                <a:pos x="connsiteX4" y="connsiteY4"/>
               </a:cxn>
               <a:cxn ang="0">
-                <a:pos x="connsiteX12" y="connsiteY12"/>
+                <a:pos x="connsiteX5" y="connsiteY5"/>
               </a:cxn>
               <a:cxn ang="0">
-                <a:pos x="connsiteX13" y="connsiteY13"/>
-              </a:cxn>
-              <a:cxn ang="0">
-                <a:pos x="connsiteX14" y="connsiteY14"/>
-              </a:cxn>
-              <a:cxn ang="0">
-                <a:pos x="connsiteX15" y="connsiteY15"/>
-              </a:cxn>
-              <a:cxn ang="0">
-                <a:pos x="connsiteX16" y="connsiteY16"/>
+                <a:pos x="connsiteX6" y="connsiteY6"/>
               </a:cxn>
             </a:cxnLst>
             <a:rect l="l" t="t" r="r" b="b"/>
             <a:pathLst>
-              <a:path w="4480560" h="18288" fill="none" extrusionOk="0">
+              <a:path w="4811477" h="6858000">
                 <a:moveTo>
                   <a:pt x="0" y="0"/>
                 </a:moveTo>
+                <a:lnTo>
+                  <a:pt x="3598499" y="0"/>
+                </a:lnTo>
+                <a:lnTo>
+                  <a:pt x="3661482" y="69271"/>
+                </a:lnTo>
                 <a:cubicBezTo>
-                  <a:pt x="267821" y="8731"/>
-                  <a:pt x="334105" y="2629"/>
-                  <a:pt x="595274" y="0"/>
+                  <a:pt x="4372008" y="929100"/>
+                  <a:pt x="4811477" y="2116944"/>
+                  <a:pt x="4811477" y="3429000"/>
                 </a:cubicBezTo>
                 <a:cubicBezTo>
-                  <a:pt x="856443" y="-2629"/>
-                  <a:pt x="863808" y="-13353"/>
-                  <a:pt x="1100938" y="0"/>
+                  <a:pt x="4811477" y="4741056"/>
+                  <a:pt x="4372008" y="5928900"/>
+                  <a:pt x="3661482" y="6788730"/>
                 </a:cubicBezTo>
-                <a:cubicBezTo>
-                  <a:pt x="1338068" y="13353"/>
-                  <a:pt x="1431663" y="-25862"/>
-                  <a:pt x="1651406" y="0"/>
-                </a:cubicBezTo>
-                <a:cubicBezTo>
-                  <a:pt x="1871149" y="25862"/>
-                  <a:pt x="2173163" y="23827"/>
-                  <a:pt x="2336292" y="0"/>
-                </a:cubicBezTo>
-                <a:cubicBezTo>
-                  <a:pt x="2499421" y="-23827"/>
-                  <a:pt x="2720589" y="28148"/>
-                  <a:pt x="2931566" y="0"/>
-                </a:cubicBezTo>
-                <a:cubicBezTo>
-                  <a:pt x="3142543" y="-28148"/>
-                  <a:pt x="3323630" y="27022"/>
-                  <a:pt x="3482035" y="0"/>
-                </a:cubicBezTo>
-                <a:cubicBezTo>
-                  <a:pt x="3640440" y="-27022"/>
-                  <a:pt x="4012110" y="-20118"/>
-                  <a:pt x="4480560" y="0"/>
-                </a:cubicBezTo>
-                <a:cubicBezTo>
-                  <a:pt x="4480958" y="7429"/>
-                  <a:pt x="4480540" y="10822"/>
-                  <a:pt x="4480560" y="18288"/>
-                </a:cubicBezTo>
-                <a:cubicBezTo>
-                  <a:pt x="4314132" y="14924"/>
-                  <a:pt x="4028383" y="36632"/>
-                  <a:pt x="3840480" y="18288"/>
-                </a:cubicBezTo>
-                <a:cubicBezTo>
-                  <a:pt x="3652577" y="-56"/>
-                  <a:pt x="3547615" y="2848"/>
-                  <a:pt x="3290011" y="18288"/>
-                </a:cubicBezTo>
-                <a:cubicBezTo>
-                  <a:pt x="3032407" y="33728"/>
-                  <a:pt x="2830268" y="8719"/>
-                  <a:pt x="2560320" y="18288"/>
-                </a:cubicBezTo>
-                <a:cubicBezTo>
-                  <a:pt x="2290372" y="27857"/>
-                  <a:pt x="2147422" y="6728"/>
-                  <a:pt x="1965046" y="18288"/>
-                </a:cubicBezTo>
-                <a:cubicBezTo>
-                  <a:pt x="1782670" y="29848"/>
-                  <a:pt x="1689791" y="40680"/>
-                  <a:pt x="1459382" y="18288"/>
-                </a:cubicBezTo>
-                <a:cubicBezTo>
-                  <a:pt x="1228973" y="-4104"/>
-                  <a:pt x="915486" y="36501"/>
-                  <a:pt x="774497" y="18288"/>
-                </a:cubicBezTo>
-                <a:cubicBezTo>
-                  <a:pt x="633508" y="75"/>
-                  <a:pt x="361442" y="-11107"/>
-                  <a:pt x="0" y="18288"/>
-                </a:cubicBezTo>
-                <a:cubicBezTo>
-                  <a:pt x="-591" y="13205"/>
-                  <a:pt x="-663" y="6329"/>
-                  <a:pt x="0" y="0"/>
-                </a:cubicBezTo>
-                <a:close/>
-              </a:path>
-              <a:path w="4480560" h="18288" stroke="0" extrusionOk="0">
-                <a:moveTo>
-                  <a:pt x="0" y="0"/>
-                </a:moveTo>
-                <a:cubicBezTo>
-                  <a:pt x="285465" y="225"/>
-                  <a:pt x="322691" y="16223"/>
-                  <a:pt x="595274" y="0"/>
-                </a:cubicBezTo>
-                <a:cubicBezTo>
-                  <a:pt x="867857" y="-16223"/>
-                  <a:pt x="989129" y="-11242"/>
-                  <a:pt x="1100938" y="0"/>
-                </a:cubicBezTo>
-                <a:cubicBezTo>
-                  <a:pt x="1212747" y="11242"/>
-                  <a:pt x="1574350" y="-36410"/>
-                  <a:pt x="1830629" y="0"/>
-                </a:cubicBezTo>
-                <a:cubicBezTo>
-                  <a:pt x="2086908" y="36410"/>
-                  <a:pt x="2180922" y="4645"/>
-                  <a:pt x="2425903" y="0"/>
-                </a:cubicBezTo>
-                <a:cubicBezTo>
-                  <a:pt x="2670884" y="-4645"/>
-                  <a:pt x="2782024" y="22929"/>
-                  <a:pt x="3021178" y="0"/>
-                </a:cubicBezTo>
-                <a:cubicBezTo>
-                  <a:pt x="3260332" y="-22929"/>
-                  <a:pt x="3456982" y="-1586"/>
-                  <a:pt x="3750869" y="0"/>
-                </a:cubicBezTo>
-                <a:cubicBezTo>
-                  <a:pt x="4044756" y="1586"/>
-                  <a:pt x="4302726" y="17043"/>
-                  <a:pt x="4480560" y="0"/>
-                </a:cubicBezTo>
-                <a:cubicBezTo>
-                  <a:pt x="4479674" y="5429"/>
-                  <a:pt x="4481381" y="14046"/>
-                  <a:pt x="4480560" y="18288"/>
-                </a:cubicBezTo>
-                <a:cubicBezTo>
-                  <a:pt x="4279652" y="-6850"/>
-                  <a:pt x="4200762" y="41566"/>
-                  <a:pt x="3930091" y="18288"/>
-                </a:cubicBezTo>
-                <a:cubicBezTo>
-                  <a:pt x="3659420" y="-4990"/>
-                  <a:pt x="3456052" y="22294"/>
-                  <a:pt x="3290011" y="18288"/>
-                </a:cubicBezTo>
-                <a:cubicBezTo>
-                  <a:pt x="3123970" y="14282"/>
-                  <a:pt x="2882392" y="32818"/>
-                  <a:pt x="2649931" y="18288"/>
-                </a:cubicBezTo>
-                <a:cubicBezTo>
-                  <a:pt x="2417470" y="3758"/>
-                  <a:pt x="2238426" y="7337"/>
-                  <a:pt x="2054657" y="18288"/>
-                </a:cubicBezTo>
-                <a:cubicBezTo>
-                  <a:pt x="1870888" y="29239"/>
-                  <a:pt x="1566368" y="45040"/>
-                  <a:pt x="1324966" y="18288"/>
-                </a:cubicBezTo>
-                <a:cubicBezTo>
-                  <a:pt x="1083564" y="-8464"/>
-                  <a:pt x="787410" y="10946"/>
-                  <a:pt x="595274" y="18288"/>
-                </a:cubicBezTo>
-                <a:cubicBezTo>
-                  <a:pt x="403138" y="25630"/>
-                  <a:pt x="169622" y="10499"/>
-                  <a:pt x="0" y="18288"/>
-                </a:cubicBezTo>
-                <a:cubicBezTo>
-                  <a:pt x="668" y="13665"/>
-                  <a:pt x="578" y="5675"/>
-                  <a:pt x="0" y="0"/>
-                </a:cubicBezTo>
+                <a:lnTo>
+                  <a:pt x="3598499" y="6858000"/>
+                </a:lnTo>
+                <a:lnTo>
+                  <a:pt x="0" y="6858000"/>
+                </a:lnTo>
                 <a:close/>
               </a:path>
             </a:pathLst>
           </a:custGeom>
+          <a:ln w="9525">
+            <a:noFill/>
+          </a:ln>
+          <a:effectLst/>
+        </p:spPr>
+        <p:style>
+          <a:lnRef idx="2">
+            <a:schemeClr val="accent1">
+              <a:shade val="50000"/>
+            </a:schemeClr>
+          </a:lnRef>
+          <a:fillRef idx="1">
+            <a:schemeClr val="accent1"/>
+          </a:fillRef>
+          <a:effectRef idx="0">
+            <a:schemeClr val="accent1"/>
+          </a:effectRef>
+          <a:fontRef idx="minor">
+            <a:schemeClr val="lt1"/>
+          </a:fontRef>
+        </p:style>
+        <p:txBody>
+          <a:bodyPr wrap="square" rtlCol="0" anchor="ctr">
+            <a:noAutofit/>
+          </a:bodyPr>
+          <a:lstStyle/>
+          <a:p>
+            <a:pPr marL="0" marR="0" lvl="0" indent="0" algn="ctr" defTabSz="914400" rtl="0" eaLnBrk="1" fontAlgn="auto" latinLnBrk="0" hangingPunct="1">
+              <a:lnSpc>
+                <a:spcPct val="100000"/>
+              </a:lnSpc>
+              <a:spcBef>
+                <a:spcPts val="0"/>
+              </a:spcBef>
+              <a:spcAft>
+                <a:spcPts val="0"/>
+              </a:spcAft>
+              <a:buClrTx/>
+              <a:buSzTx/>
+              <a:buFontTx/>
+              <a:buNone/>
+              <a:tabLst/>
+              <a:defRPr/>
+            </a:pPr>
+            <a:endParaRPr kumimoji="0" lang="en-US" sz="1800" b="0" i="0" u="none" strike="noStrike" kern="1200" cap="none" spc="0" normalizeH="0" baseline="0" noProof="0">
+              <a:ln>
+                <a:noFill/>
+              </a:ln>
+              <a:solidFill>
+                <a:prstClr val="white"/>
+              </a:solidFill>
+              <a:effectLst/>
+              <a:uLnTx/>
+              <a:uFillTx/>
+              <a:latin typeface="Calibri" panose="020F0502020204030204"/>
+              <a:ea typeface="+mn-ea"/>
+              <a:cs typeface="+mn-cs"/>
+            </a:endParaRPr>
+          </a:p>
+        </p:txBody>
+      </p:sp>
+      <p:sp>
+        <p:nvSpPr>
+          <p:cNvPr id="7" name="Title 6">
+            <a:extLst>
+              <a:ext uri="{FF2B5EF4-FFF2-40B4-BE49-F238E27FC236}">
+                <a16:creationId xmlns:a16="http://schemas.microsoft.com/office/drawing/2014/main" id="{C450EE17-B052-0F29-575F-B095B42F1C9D}"/>
+              </a:ext>
+            </a:extLst>
+          </p:cNvPr>
+          <p:cNvSpPr>
+            <a:spLocks noGrp="1"/>
+          </p:cNvSpPr>
+          <p:nvPr>
+            <p:ph type="title"/>
+          </p:nvPr>
+        </p:nvSpPr>
+        <p:spPr>
+          <a:xfrm>
+            <a:off x="621792" y="1161288"/>
+            <a:ext cx="3602736" cy="4526280"/>
+          </a:xfrm>
+        </p:spPr>
+        <p:txBody>
+          <a:bodyPr>
+            <a:normAutofit/>
+          </a:bodyPr>
+          <a:lstStyle/>
+          <a:p>
+            <a:r>
+              <a:rPr lang="en-US" sz="4000" b="1" dirty="0">
+                <a:latin typeface="Times New Roman" panose="02020603050405020304" pitchFamily="18" charset="0"/>
+                <a:cs typeface="Times New Roman" panose="02020603050405020304" pitchFamily="18" charset="0"/>
+              </a:rPr>
+              <a:t>Contents</a:t>
+            </a:r>
+            <a:br>
+              <a:rPr lang="en-US" sz="4000" dirty="0"/>
+            </a:br>
+            <a:endParaRPr lang="de-DE" sz="4000" dirty="0"/>
+          </a:p>
+        </p:txBody>
+      </p:sp>
+      <p:sp>
+        <p:nvSpPr>
+          <p:cNvPr id="37" name="Rectangle 36">
+            <a:extLst>
+              <a:ext uri="{FF2B5EF4-FFF2-40B4-BE49-F238E27FC236}">
+                <a16:creationId xmlns:a16="http://schemas.microsoft.com/office/drawing/2014/main" id="{463EEC44-1BA3-44ED-81FC-A644B04B2A44}"/>
+              </a:ext>
+              <a:ext uri="{C183D7F6-B498-43B3-948B-1728B52AA6E4}">
+                <adec:decorative xmlns:adec="http://schemas.microsoft.com/office/drawing/2017/decorative" val="1"/>
+              </a:ext>
+            </a:extLst>
+          </p:cNvPr>
+          <p:cNvSpPr>
+            <a:spLocks noGrp="1" noRot="1" noChangeAspect="1" noMove="1" noResize="1" noEditPoints="1" noAdjustHandles="1" noChangeArrowheads="1" noChangeShapeType="1" noTextEdit="1"/>
+          </p:cNvSpPr>
+          <p:nvPr>
+            <p:extLst>
+              <p:ext uri="{386F3935-93C4-4BCD-93E2-E3B085C9AB24}">
+                <p16:designElem xmlns:p16="http://schemas.microsoft.com/office/powerpoint/2015/main" val="1"/>
+              </p:ext>
+            </p:extLst>
+          </p:nvPr>
+        </p:nvSpPr>
+        <p:spPr>
+          <a:xfrm>
+            <a:off x="0" y="3102049"/>
+            <a:ext cx="128016" cy="653903"/>
+          </a:xfrm>
+          <a:prstGeom prst="rect">
+            <a:avLst/>
+          </a:prstGeom>
           <a:solidFill>
             <a:schemeClr val="accent2"/>
           </a:solidFill>
-          <a:ln w="41275" cap="rnd">
-            <a:solidFill>
-              <a:schemeClr val="accent2"/>
-            </a:solidFill>
-            <a:round/>
-            <a:extLst>
-              <a:ext uri="{C807C97D-BFC1-408E-A445-0C87EB9F89A2}">
-                <ask:lineSketchStyleProps xmlns:ask="http://schemas.microsoft.com/office/drawing/2018/sketchyshapes" sd="1219033472">
-                  <a:prstGeom prst="rect">
-                    <a:avLst/>
-                  </a:prstGeom>
-                  <ask:type>
-                    <ask:lineSketchFreehand/>
-                  </ask:type>
-                </ask:lineSketchStyleProps>
-              </a:ext>
-            </a:extLst>
+          <a:ln>
+            <a:noFill/>
           </a:ln>
         </p:spPr>
         <p:style>
@@ -23410,7 +23511,12 @@
           <a:lstStyle/>
           <a:p>
             <a:pPr algn="ctr"/>
-            <a:endParaRPr lang="en-US"/>
+            <a:endParaRPr lang="en-US">
+              <a:solidFill>
+                <a:prstClr val="white"/>
+              </a:solidFill>
+              <a:latin typeface="Calibri" panose="020F0502020204030204"/>
+            </a:endParaRPr>
           </a:p>
         </p:txBody>
       </p:sp>
@@ -23432,8 +23538,8 @@
         </p:nvSpPr>
         <p:spPr>
           <a:xfrm>
-            <a:off x="5126418" y="552091"/>
-            <a:ext cx="6224335" cy="5431536"/>
+            <a:off x="5434149" y="932688"/>
+            <a:ext cx="5916603" cy="4992624"/>
           </a:xfrm>
         </p:spPr>
         <p:txBody>
@@ -23443,7 +23549,7 @@
           <a:lstStyle/>
           <a:p>
             <a:r>
-              <a:rPr lang="en-GB" sz="2200" dirty="0">
+              <a:rPr lang="en-GB" sz="2000" dirty="0">
                 <a:latin typeface="Times New Roman" panose="02020603050405020304" pitchFamily="18" charset="0"/>
                 <a:cs typeface="Times New Roman" panose="02020603050405020304" pitchFamily="18" charset="0"/>
               </a:rPr>
@@ -23452,7 +23558,7 @@
           </a:p>
           <a:p>
             <a:r>
-              <a:rPr lang="en-GB" sz="2200" dirty="0">
+              <a:rPr lang="en-GB" sz="2000" dirty="0">
                 <a:latin typeface="Times New Roman" panose="02020603050405020304" pitchFamily="18" charset="0"/>
                 <a:cs typeface="Times New Roman" panose="02020603050405020304" pitchFamily="18" charset="0"/>
               </a:rPr>
@@ -23461,7 +23567,7 @@
           </a:p>
           <a:p>
             <a:r>
-              <a:rPr lang="en-GB" sz="2200" dirty="0">
+              <a:rPr lang="en-GB" sz="2000" dirty="0">
                 <a:latin typeface="Times New Roman" panose="02020603050405020304" pitchFamily="18" charset="0"/>
                 <a:cs typeface="Times New Roman" panose="02020603050405020304" pitchFamily="18" charset="0"/>
               </a:rPr>
@@ -23470,7 +23576,7 @@
           </a:p>
           <a:p>
             <a:r>
-              <a:rPr lang="en-GB" sz="2200" dirty="0">
+              <a:rPr lang="en-GB" sz="2000" dirty="0">
                 <a:latin typeface="Times New Roman" panose="02020603050405020304" pitchFamily="18" charset="0"/>
                 <a:cs typeface="Times New Roman" panose="02020603050405020304" pitchFamily="18" charset="0"/>
               </a:rPr>
@@ -23479,7 +23585,7 @@
           </a:p>
           <a:p>
             <a:r>
-              <a:rPr lang="en-GB" sz="2200" dirty="0">
+              <a:rPr lang="en-GB" sz="2000" dirty="0">
                 <a:latin typeface="Times New Roman" panose="02020603050405020304" pitchFamily="18" charset="0"/>
                 <a:cs typeface="Times New Roman" panose="02020603050405020304" pitchFamily="18" charset="0"/>
               </a:rPr>
@@ -23488,7 +23594,7 @@
           </a:p>
           <a:p>
             <a:r>
-              <a:rPr lang="en-GB" sz="2200" dirty="0">
+              <a:rPr lang="en-GB" sz="2000" dirty="0">
                 <a:latin typeface="Times New Roman" panose="02020603050405020304" pitchFamily="18" charset="0"/>
                 <a:cs typeface="Times New Roman" panose="02020603050405020304" pitchFamily="18" charset="0"/>
               </a:rPr>
@@ -23497,7 +23603,7 @@
           </a:p>
           <a:p>
             <a:r>
-              <a:rPr lang="en-GB" sz="2200" dirty="0">
+              <a:rPr lang="en-GB" sz="2000" dirty="0">
                 <a:latin typeface="Times New Roman" panose="02020603050405020304" pitchFamily="18" charset="0"/>
                 <a:cs typeface="Times New Roman" panose="02020603050405020304" pitchFamily="18" charset="0"/>
               </a:rPr>
@@ -23506,7 +23612,7 @@
           </a:p>
           <a:p>
             <a:r>
-              <a:rPr lang="en-GB" sz="2200" dirty="0">
+              <a:rPr lang="en-GB" sz="2000" dirty="0">
                 <a:latin typeface="Times New Roman" panose="02020603050405020304" pitchFamily="18" charset="0"/>
                 <a:cs typeface="Times New Roman" panose="02020603050405020304" pitchFamily="18" charset="0"/>
               </a:rPr>
@@ -23515,7 +23621,7 @@
           </a:p>
           <a:p>
             <a:r>
-              <a:rPr lang="en-GB" sz="2200" dirty="0">
+              <a:rPr lang="en-GB" sz="2000" dirty="0">
                 <a:latin typeface="Times New Roman" panose="02020603050405020304" pitchFamily="18" charset="0"/>
                 <a:cs typeface="Times New Roman" panose="02020603050405020304" pitchFamily="18" charset="0"/>
               </a:rPr>
@@ -23524,13 +23630,13 @@
           </a:p>
           <a:p>
             <a:r>
-              <a:rPr lang="en-GB" sz="2200" dirty="0">
+              <a:rPr lang="en-GB" sz="2000" dirty="0">
                 <a:latin typeface="Times New Roman" panose="02020603050405020304" pitchFamily="18" charset="0"/>
                 <a:cs typeface="Times New Roman" panose="02020603050405020304" pitchFamily="18" charset="0"/>
               </a:rPr>
               <a:t>Conclusion</a:t>
             </a:r>
-            <a:endParaRPr lang="en-DE" sz="2200" dirty="0">
+            <a:endParaRPr lang="en-DE" sz="2000" dirty="0">
               <a:latin typeface="Times New Roman" panose="02020603050405020304" pitchFamily="18" charset="0"/>
               <a:cs typeface="Times New Roman" panose="02020603050405020304" pitchFamily="18" charset="0"/>
             </a:endParaRPr>
@@ -25099,7 +25205,7 @@
               <a:buChar char="•"/>
             </a:pPr>
             <a:r>
-              <a:rPr lang="en-US" sz="1600" b="1" i="0" dirty="0">
+              <a:rPr lang="en-US" sz="2000" b="1" i="0" dirty="0">
                 <a:effectLst/>
                 <a:latin typeface="Times New Roman" panose="02020603050405020304" pitchFamily="18" charset="0"/>
                 <a:cs typeface="Times New Roman" panose="02020603050405020304" pitchFamily="18" charset="0"/>
@@ -25107,29 +25213,13 @@
               <a:t>Asterisk</a:t>
             </a:r>
             <a:r>
-              <a:rPr lang="en-US" sz="1600" b="0" i="0" dirty="0">
+              <a:rPr lang="en-US" sz="2000" b="0" i="0" dirty="0">
                 <a:effectLst/>
                 <a:latin typeface="Times New Roman" panose="02020603050405020304" pitchFamily="18" charset="0"/>
                 <a:cs typeface="Times New Roman" panose="02020603050405020304" pitchFamily="18" charset="0"/>
               </a:rPr>
               <a:t> is a free, open-source software that acts as a PBX system. It enables you to set up your own VoIP server, supporting various VoIP protocols, including SIP, MGCP, and IAX, among others.</a:t>
             </a:r>
-          </a:p>
-          <a:p>
-            <a:pPr marL="400050" indent="-285750">
-              <a:lnSpc>
-                <a:spcPct val="90000"/>
-              </a:lnSpc>
-              <a:spcAft>
-                <a:spcPts val="600"/>
-              </a:spcAft>
-              <a:buFont typeface="Arial" panose="020B0604020202020204" pitchFamily="34" charset="0"/>
-              <a:buChar char="•"/>
-            </a:pPr>
-            <a:endParaRPr lang="en-US" sz="1600" dirty="0">
-              <a:latin typeface="Times New Roman" panose="02020603050405020304" pitchFamily="18" charset="0"/>
-              <a:cs typeface="Times New Roman" panose="02020603050405020304" pitchFamily="18" charset="0"/>
-            </a:endParaRPr>
           </a:p>
           <a:p>
             <a:pPr marL="114300">
@@ -25140,7 +25230,7 @@
                 <a:spcPts val="600"/>
               </a:spcAft>
             </a:pPr>
-            <a:endParaRPr lang="en-US" sz="1600" b="0" i="0" dirty="0">
+            <a:endParaRPr lang="en-US" sz="2000" b="0" i="0" dirty="0">
               <a:effectLst/>
               <a:latin typeface="Times New Roman" panose="02020603050405020304" pitchFamily="18" charset="0"/>
               <a:cs typeface="Times New Roman" panose="02020603050405020304" pitchFamily="18" charset="0"/>
@@ -25158,7 +25248,7 @@
               <a:buChar char="•"/>
             </a:pPr>
             <a:r>
-              <a:rPr lang="en-US" sz="1600" b="1" i="0" dirty="0">
+              <a:rPr lang="en-US" sz="2000" b="1" i="0" dirty="0">
                 <a:effectLst/>
                 <a:latin typeface="Times New Roman" panose="02020603050405020304" pitchFamily="18" charset="0"/>
                 <a:cs typeface="Times New Roman" panose="02020603050405020304" pitchFamily="18" charset="0"/>
@@ -25166,7 +25256,7 @@
               <a:t>Twinkle</a:t>
             </a:r>
             <a:r>
-              <a:rPr lang="en-US" sz="1600" b="0" i="0" dirty="0">
+              <a:rPr lang="en-US" sz="2000" b="0" i="0" dirty="0">
                 <a:effectLst/>
                 <a:latin typeface="Times New Roman" panose="02020603050405020304" pitchFamily="18" charset="0"/>
                 <a:cs typeface="Times New Roman" panose="02020603050405020304" pitchFamily="18" charset="0"/>
@@ -26201,13 +26291,13 @@
               </a:spcAft>
             </a:pPr>
             <a:r>
-              <a:rPr lang="en-US" sz="8000" kern="1200">
+              <a:rPr lang="en-US" sz="8000" kern="1200" dirty="0">
                 <a:solidFill>
                   <a:schemeClr val="tx1"/>
                 </a:solidFill>
-                <a:latin typeface="+mj-lt"/>
+                <a:latin typeface="Times New Roman" panose="02020603050405020304" pitchFamily="18" charset="0"/>
                 <a:ea typeface="+mj-ea"/>
-                <a:cs typeface="+mj-cs"/>
+                <a:cs typeface="Times New Roman" panose="02020603050405020304" pitchFamily="18" charset="0"/>
               </a:rPr>
               <a:t>Next cloud - Demo</a:t>
             </a:r>
@@ -26752,9 +26842,9 @@
             </a:pPr>
             <a:r>
               <a:rPr lang="en-US" sz="8000" dirty="0">
-                <a:latin typeface="+mj-lt"/>
+                <a:latin typeface="Times New Roman" panose="02020603050405020304" pitchFamily="18" charset="0"/>
                 <a:ea typeface="+mj-ea"/>
-                <a:cs typeface="+mj-cs"/>
+                <a:cs typeface="Times New Roman" panose="02020603050405020304" pitchFamily="18" charset="0"/>
               </a:rPr>
               <a:t>Video Streaming</a:t>
             </a:r>
@@ -26763,9 +26853,9 @@
                 <a:solidFill>
                   <a:schemeClr val="tx1"/>
                 </a:solidFill>
-                <a:latin typeface="+mj-lt"/>
+                <a:latin typeface="Times New Roman" panose="02020603050405020304" pitchFamily="18" charset="0"/>
                 <a:ea typeface="+mj-ea"/>
-                <a:cs typeface="+mj-cs"/>
+                <a:cs typeface="Times New Roman" panose="02020603050405020304" pitchFamily="18" charset="0"/>
               </a:rPr>
               <a:t> - Demo</a:t>
             </a:r>
@@ -27461,7 +27551,7 @@
           <a:lstStyle/>
           <a:p>
             <a:r>
-              <a:rPr lang="de-DE" sz="5200" b="1">
+              <a:rPr lang="de-DE" sz="4800" b="1" dirty="0">
                 <a:latin typeface="Times New Roman" panose="02020603050405020304" pitchFamily="18" charset="0"/>
                 <a:cs typeface="Times New Roman" panose="02020603050405020304" pitchFamily="18" charset="0"/>
               </a:rPr>
@@ -27682,9 +27772,9 @@
                 <a:solidFill>
                   <a:schemeClr val="tx1"/>
                 </a:solidFill>
-                <a:latin typeface="+mj-lt"/>
+                <a:latin typeface="Times New Roman" panose="02020603050405020304" pitchFamily="18" charset="0"/>
                 <a:ea typeface="+mj-ea"/>
-                <a:cs typeface="+mj-cs"/>
+                <a:cs typeface="Times New Roman" panose="02020603050405020304" pitchFamily="18" charset="0"/>
               </a:rPr>
               <a:t>Internet - Demo</a:t>
             </a:r>
@@ -28303,7 +28393,7 @@
         </p:nvSpPr>
         <p:spPr>
           <a:xfrm>
-            <a:off x="3193517" y="2730924"/>
+            <a:off x="2472157" y="2659804"/>
             <a:ext cx="5801917" cy="2057045"/>
           </a:xfrm>
         </p:spPr>
@@ -28317,7 +28407,7 @@
               <a:buNone/>
             </a:pPr>
             <a:r>
-              <a:rPr lang="de-DE" sz="4800" b="1" i="1" dirty="0">
+              <a:rPr lang="de-DE" sz="8000" b="1" i="1" dirty="0">
                 <a:latin typeface="Times New Roman" panose="02020603050405020304" pitchFamily="18" charset="0"/>
                 <a:cs typeface="Times New Roman" panose="02020603050405020304" pitchFamily="18" charset="0"/>
               </a:rPr>
@@ -28817,7 +28907,7 @@
               <a:buNone/>
             </a:pPr>
             <a:r>
-              <a:rPr lang="de-DE" sz="3600" b="1" dirty="0">
+              <a:rPr lang="de-DE" sz="4800" b="1" dirty="0">
                 <a:latin typeface="Times New Roman" panose="02020603050405020304" pitchFamily="18" charset="0"/>
                 <a:cs typeface="Times New Roman" panose="02020603050405020304" pitchFamily="18" charset="0"/>
               </a:rPr>
@@ -29090,7 +29180,7 @@
             <p:ph idx="1"/>
             <p:extLst>
               <p:ext uri="{D42A27DB-BD31-4B8C-83A1-F6EECF244321}">
-                <p14:modId xmlns:p14="http://schemas.microsoft.com/office/powerpoint/2010/main" val="4030577435"/>
+                <p14:modId xmlns:p14="http://schemas.microsoft.com/office/powerpoint/2010/main" val="1774160973"/>
               </p:ext>
             </p:extLst>
           </p:nvPr>
@@ -29327,7 +29417,7 @@
         <p:spPr>
           <a:xfrm>
             <a:off x="901690" y="405575"/>
-            <a:ext cx="6430414" cy="1371600"/>
+            <a:ext cx="9796790" cy="1371600"/>
           </a:xfrm>
         </p:spPr>
         <p:txBody>
@@ -29337,13 +29427,12 @@
           <a:lstStyle/>
           <a:p>
             <a:r>
-              <a:rPr lang="en-US" sz="4000" b="1" kern="1200" dirty="0">
+              <a:rPr lang="en-US" sz="4800" b="1" kern="1200" dirty="0">
                 <a:solidFill>
                   <a:schemeClr val="tx1"/>
                 </a:solidFill>
-                <a:latin typeface="+mj-lt"/>
-                <a:ea typeface="+mj-ea"/>
-                <a:cs typeface="+mj-cs"/>
+                <a:latin typeface="Times New Roman" panose="02020603050405020304" pitchFamily="18" charset="0"/>
+                <a:cs typeface="Times New Roman" panose="02020603050405020304" pitchFamily="18" charset="0"/>
               </a:rPr>
               <a:t>Key features of 5G technology</a:t>
             </a:r>
@@ -29613,9 +29702,258 @@
           <a:chExt cx="0" cy="0"/>
         </a:xfrm>
       </p:grpSpPr>
+      <p:sp useBgFill="1">
+        <p:nvSpPr>
+          <p:cNvPr id="14" name="Rectangle 13">
+            <a:extLst>
+              <a:ext uri="{FF2B5EF4-FFF2-40B4-BE49-F238E27FC236}">
+                <a16:creationId xmlns:a16="http://schemas.microsoft.com/office/drawing/2014/main" id="{53B021B3-DE93-4AB7-8A18-CF5F1CED88B8}"/>
+              </a:ext>
+              <a:ext uri="{C183D7F6-B498-43B3-948B-1728B52AA6E4}">
+                <adec:decorative xmlns:adec="http://schemas.microsoft.com/office/drawing/2017/decorative" val="1"/>
+              </a:ext>
+            </a:extLst>
+          </p:cNvPr>
+          <p:cNvSpPr>
+            <a:spLocks noGrp="1" noRot="1" noChangeAspect="1" noMove="1" noResize="1" noEditPoints="1" noAdjustHandles="1" noChangeArrowheads="1" noChangeShapeType="1" noTextEdit="1"/>
+          </p:cNvSpPr>
+          <p:nvPr>
+            <p:extLst>
+              <p:ext uri="{386F3935-93C4-4BCD-93E2-E3B085C9AB24}">
+                <p16:designElem xmlns:p16="http://schemas.microsoft.com/office/powerpoint/2015/main" val="1"/>
+              </p:ext>
+            </p:extLst>
+          </p:nvPr>
+        </p:nvSpPr>
+        <p:spPr>
+          <a:xfrm>
+            <a:off x="0" y="0"/>
+            <a:ext cx="12192000" cy="6858000"/>
+          </a:xfrm>
+          <a:prstGeom prst="rect">
+            <a:avLst/>
+          </a:prstGeom>
+          <a:ln>
+            <a:noFill/>
+          </a:ln>
+        </p:spPr>
+        <p:style>
+          <a:lnRef idx="2">
+            <a:schemeClr val="accent1">
+              <a:shade val="50000"/>
+            </a:schemeClr>
+          </a:lnRef>
+          <a:fillRef idx="1">
+            <a:schemeClr val="accent1"/>
+          </a:fillRef>
+          <a:effectRef idx="0">
+            <a:schemeClr val="accent1"/>
+          </a:effectRef>
+          <a:fontRef idx="minor">
+            <a:schemeClr val="lt1"/>
+          </a:fontRef>
+        </p:style>
+        <p:txBody>
+          <a:bodyPr rtlCol="0" anchor="ctr"/>
+          <a:lstStyle/>
+          <a:p>
+            <a:pPr algn="ctr"/>
+            <a:endParaRPr lang="en-US"/>
+          </a:p>
+        </p:txBody>
+      </p:sp>
+      <p:sp>
+        <p:nvSpPr>
+          <p:cNvPr id="7" name="Title 6">
+            <a:extLst>
+              <a:ext uri="{FF2B5EF4-FFF2-40B4-BE49-F238E27FC236}">
+                <a16:creationId xmlns:a16="http://schemas.microsoft.com/office/drawing/2014/main" id="{F8EE94DE-510E-350B-832A-4962F5A33978}"/>
+              </a:ext>
+            </a:extLst>
+          </p:cNvPr>
+          <p:cNvSpPr>
+            <a:spLocks noGrp="1"/>
+          </p:cNvSpPr>
+          <p:nvPr>
+            <p:ph type="title"/>
+          </p:nvPr>
+        </p:nvSpPr>
+        <p:spPr>
+          <a:xfrm>
+            <a:off x="841248" y="493862"/>
+            <a:ext cx="10506456" cy="1304458"/>
+          </a:xfrm>
+        </p:spPr>
+        <p:txBody>
+          <a:bodyPr anchor="b">
+            <a:normAutofit fontScale="90000"/>
+          </a:bodyPr>
+          <a:lstStyle/>
+          <a:p>
+            <a:br>
+              <a:rPr lang="en-US" sz="3100" dirty="0"/>
+            </a:br>
+            <a:r>
+              <a:rPr lang="en-US" sz="5300" b="1" kern="1200" dirty="0">
+                <a:solidFill>
+                  <a:srgbClr val="0D0D0D"/>
+                </a:solidFill>
+                <a:latin typeface="Times New Roman" panose="02020603050405020304" pitchFamily="18" charset="0"/>
+                <a:ea typeface="+mn-ea"/>
+                <a:cs typeface="Times New Roman" panose="02020603050405020304" pitchFamily="18" charset="0"/>
+              </a:rPr>
+              <a:t>Key components and features of the 5G</a:t>
+            </a:r>
+            <a:br>
+              <a:rPr lang="de-DE" sz="4400" b="1" dirty="0">
+                <a:latin typeface="Times New Roman" panose="02020603050405020304" pitchFamily="18" charset="0"/>
+                <a:cs typeface="Times New Roman" panose="02020603050405020304" pitchFamily="18" charset="0"/>
+              </a:rPr>
+            </a:br>
+            <a:endParaRPr lang="de-DE" sz="3100" dirty="0"/>
+          </a:p>
+        </p:txBody>
+      </p:sp>
+      <p:sp>
+        <p:nvSpPr>
+          <p:cNvPr id="16" name="Rectangle 15">
+            <a:extLst>
+              <a:ext uri="{FF2B5EF4-FFF2-40B4-BE49-F238E27FC236}">
+                <a16:creationId xmlns:a16="http://schemas.microsoft.com/office/drawing/2014/main" id="{52D502E5-F6B4-4D58-B4AE-FC466FF15EE8}"/>
+              </a:ext>
+              <a:ext uri="{C183D7F6-B498-43B3-948B-1728B52AA6E4}">
+                <adec:decorative xmlns:adec="http://schemas.microsoft.com/office/drawing/2017/decorative" val="1"/>
+              </a:ext>
+            </a:extLst>
+          </p:cNvPr>
+          <p:cNvSpPr>
+            <a:spLocks noGrp="1" noRot="1" noChangeAspect="1" noMove="1" noResize="1" noEditPoints="1" noAdjustHandles="1" noChangeArrowheads="1" noChangeShapeType="1" noTextEdit="1"/>
+          </p:cNvSpPr>
+          <p:nvPr>
+            <p:extLst>
+              <p:ext uri="{386F3935-93C4-4BCD-93E2-E3B085C9AB24}">
+                <p16:designElem xmlns:p16="http://schemas.microsoft.com/office/powerpoint/2015/main" val="1"/>
+              </p:ext>
+            </p:extLst>
+          </p:nvPr>
+        </p:nvSpPr>
+        <p:spPr>
+          <a:xfrm>
+            <a:off x="865953" y="1634502"/>
+            <a:ext cx="10451592" cy="18288"/>
+          </a:xfrm>
+          <a:prstGeom prst="rect">
+            <a:avLst/>
+          </a:prstGeom>
+          <a:solidFill>
+            <a:srgbClr val="D5D5D5"/>
+          </a:solidFill>
+          <a:ln w="3175">
+            <a:noFill/>
+          </a:ln>
+          <a:effectLst/>
+        </p:spPr>
+        <p:style>
+          <a:lnRef idx="2">
+            <a:schemeClr val="accent1">
+              <a:shade val="50000"/>
+            </a:schemeClr>
+          </a:lnRef>
+          <a:fillRef idx="1">
+            <a:schemeClr val="accent1"/>
+          </a:fillRef>
+          <a:effectRef idx="0">
+            <a:schemeClr val="accent1"/>
+          </a:effectRef>
+          <a:fontRef idx="minor">
+            <a:schemeClr val="lt1"/>
+          </a:fontRef>
+        </p:style>
+        <p:txBody>
+          <a:bodyPr rtlCol="0" anchor="ctr"/>
+          <a:lstStyle/>
+          <a:p>
+            <a:pPr algn="ctr"/>
+            <a:endParaRPr lang="en-US">
+              <a:solidFill>
+                <a:prstClr val="white"/>
+              </a:solidFill>
+              <a:latin typeface="Calibri" panose="020F0502020204030204"/>
+            </a:endParaRPr>
+          </a:p>
+        </p:txBody>
+      </p:sp>
+      <p:sp>
+        <p:nvSpPr>
+          <p:cNvPr id="18" name="Rectangle 17">
+            <a:extLst>
+              <a:ext uri="{FF2B5EF4-FFF2-40B4-BE49-F238E27FC236}">
+                <a16:creationId xmlns:a16="http://schemas.microsoft.com/office/drawing/2014/main" id="{9DECDBF4-02B6-4BB4-B65B-B8107AD6A9E8}"/>
+              </a:ext>
+              <a:ext uri="{C183D7F6-B498-43B3-948B-1728B52AA6E4}">
+                <adec:decorative xmlns:adec="http://schemas.microsoft.com/office/drawing/2017/decorative" val="1"/>
+              </a:ext>
+            </a:extLst>
+          </p:cNvPr>
+          <p:cNvSpPr>
+            <a:spLocks noGrp="1" noRot="1" noChangeAspect="1" noMove="1" noResize="1" noEditPoints="1" noAdjustHandles="1" noChangeArrowheads="1" noChangeShapeType="1" noTextEdit="1"/>
+          </p:cNvSpPr>
+          <p:nvPr>
+            <p:extLst>
+              <p:ext uri="{386F3935-93C4-4BCD-93E2-E3B085C9AB24}">
+                <p16:designElem xmlns:p16="http://schemas.microsoft.com/office/powerpoint/2015/main" val="1"/>
+              </p:ext>
+            </p:extLst>
+          </p:nvPr>
+        </p:nvSpPr>
+        <p:spPr>
+          <a:xfrm flipV="1">
+            <a:off x="841248" y="1538176"/>
+            <a:ext cx="1873457" cy="109814"/>
+          </a:xfrm>
+          <a:prstGeom prst="rect">
+            <a:avLst/>
+          </a:prstGeom>
+          <a:solidFill>
+            <a:schemeClr val="accent2"/>
+          </a:solidFill>
+          <a:ln>
+            <a:noFill/>
+          </a:ln>
+        </p:spPr>
+        <p:style>
+          <a:lnRef idx="2">
+            <a:schemeClr val="accent1">
+              <a:shade val="50000"/>
+            </a:schemeClr>
+          </a:lnRef>
+          <a:fillRef idx="1">
+            <a:schemeClr val="accent1"/>
+          </a:fillRef>
+          <a:effectRef idx="0">
+            <a:schemeClr val="accent1"/>
+          </a:effectRef>
+          <a:fontRef idx="minor">
+            <a:schemeClr val="lt1"/>
+          </a:fontRef>
+        </p:style>
+        <p:txBody>
+          <a:bodyPr rtlCol="0" anchor="ctr"/>
+          <a:lstStyle/>
+          <a:p>
+            <a:pPr algn="ctr"/>
+            <a:endParaRPr lang="en-US">
+              <a:solidFill>
+                <a:prstClr val="white"/>
+              </a:solidFill>
+              <a:latin typeface="Calibri" panose="020F0502020204030204"/>
+            </a:endParaRPr>
+          </a:p>
+        </p:txBody>
+      </p:sp>
       <p:pic>
         <p:nvPicPr>
-          <p:cNvPr id="6" name="Google Shape;56;p13">
+          <p:cNvPr id="6" name="Google Shape;56;p13" descr="A logo for a university&#10;&#10;Description automatically generated">
             <a:extLst>
               <a:ext uri="{FF2B5EF4-FFF2-40B4-BE49-F238E27FC236}">
                 <a16:creationId xmlns:a16="http://schemas.microsoft.com/office/drawing/2014/main" id="{30D7ACD4-746A-70CC-CC6C-AEE5126EAA5C}"/>
@@ -29635,8 +29973,8 @@
         </p:blipFill>
         <p:spPr>
           <a:xfrm>
-            <a:off x="240778" y="5747702"/>
-            <a:ext cx="2065541" cy="810567"/>
+            <a:off x="2605747" y="5723128"/>
+            <a:ext cx="1428716" cy="560662"/>
           </a:xfrm>
           <a:prstGeom prst="rect">
             <a:avLst/>
@@ -29649,41 +29987,6 @@
       </p:pic>
       <p:sp>
         <p:nvSpPr>
-          <p:cNvPr id="7" name="Title 6">
-            <a:extLst>
-              <a:ext uri="{FF2B5EF4-FFF2-40B4-BE49-F238E27FC236}">
-                <a16:creationId xmlns:a16="http://schemas.microsoft.com/office/drawing/2014/main" id="{F8EE94DE-510E-350B-832A-4962F5A33978}"/>
-              </a:ext>
-            </a:extLst>
-          </p:cNvPr>
-          <p:cNvSpPr>
-            <a:spLocks noGrp="1"/>
-          </p:cNvSpPr>
-          <p:nvPr>
-            <p:ph type="title"/>
-          </p:nvPr>
-        </p:nvSpPr>
-        <p:spPr>
-          <a:xfrm>
-            <a:off x="838200" y="365125"/>
-            <a:ext cx="10515600" cy="691515"/>
-          </a:xfrm>
-        </p:spPr>
-        <p:txBody>
-          <a:bodyPr>
-            <a:normAutofit fontScale="90000"/>
-          </a:bodyPr>
-          <a:lstStyle/>
-          <a:p>
-            <a:br>
-              <a:rPr lang="en-US"/>
-            </a:br>
-            <a:endParaRPr lang="de-DE" dirty="0"/>
-          </a:p>
-        </p:txBody>
-      </p:sp>
-      <p:sp>
-        <p:nvSpPr>
           <p:cNvPr id="8" name="Content Placeholder 7">
             <a:extLst>
               <a:ext uri="{FF2B5EF4-FFF2-40B4-BE49-F238E27FC236}">
@@ -29692,17 +29995,18 @@
             </a:extLst>
           </p:cNvPr>
           <p:cNvSpPr>
-            <a:spLocks noGrp="1"/>
+            <a:spLocks/>
           </p:cNvSpPr>
-          <p:nvPr>
-            <p:ph idx="1"/>
-          </p:nvPr>
+          <p:nvPr/>
         </p:nvSpPr>
         <p:spPr>
           <a:xfrm>
-            <a:off x="1097280" y="258456"/>
-            <a:ext cx="9235440" cy="798184"/>
+            <a:off x="3198182" y="1926266"/>
+            <a:ext cx="6388071" cy="552097"/>
           </a:xfrm>
+          <a:prstGeom prst="rect">
+            <a:avLst/>
+          </a:prstGeom>
         </p:spPr>
         <p:txBody>
           <a:bodyPr>
@@ -29710,19 +30014,34 @@
           </a:bodyPr>
           <a:lstStyle/>
           <a:p>
-            <a:pPr marL="0" indent="0" algn="ctr">
-              <a:buNone/>
+            <a:pPr algn="ctr" defTabSz="630936">
+              <a:lnSpc>
+                <a:spcPct val="90000"/>
+              </a:lnSpc>
+              <a:spcAft>
+                <a:spcPts val="600"/>
+              </a:spcAft>
             </a:pPr>
-            <a:endParaRPr lang="de-DE" sz="4800">
+            <a:endParaRPr lang="de-DE" sz="1500" kern="1200">
+              <a:solidFill>
+                <a:schemeClr val="tx1"/>
+              </a:solidFill>
               <a:latin typeface="Times New Roman" panose="02020603050405020304" pitchFamily="18" charset="0"/>
+              <a:ea typeface="+mn-ea"/>
               <a:cs typeface="Times New Roman" panose="02020603050405020304" pitchFamily="18" charset="0"/>
             </a:endParaRPr>
           </a:p>
           <a:p>
             <a:pPr marL="0" indent="0" algn="ctr">
+              <a:lnSpc>
+                <a:spcPct val="90000"/>
+              </a:lnSpc>
+              <a:spcAft>
+                <a:spcPts val="600"/>
+              </a:spcAft>
               <a:buNone/>
             </a:pPr>
-            <a:endParaRPr lang="de-DE" sz="3600" dirty="0">
+            <a:endParaRPr lang="de-DE" sz="1500">
               <a:latin typeface="Times New Roman" panose="02020603050405020304" pitchFamily="18" charset="0"/>
               <a:cs typeface="Times New Roman" panose="02020603050405020304" pitchFamily="18" charset="0"/>
             </a:endParaRPr>
@@ -29731,10 +30050,10 @@
       </p:sp>
       <p:sp>
         <p:nvSpPr>
-          <p:cNvPr id="4" name="TextBox 3">
+          <p:cNvPr id="9" name="TextBox 8">
             <a:extLst>
               <a:ext uri="{FF2B5EF4-FFF2-40B4-BE49-F238E27FC236}">
-                <a16:creationId xmlns:a16="http://schemas.microsoft.com/office/drawing/2014/main" id="{D235183D-3247-C54E-5A6D-E8FC99A734DC}"/>
+                <a16:creationId xmlns:a16="http://schemas.microsoft.com/office/drawing/2014/main" id="{276FCC2A-CA41-D789-A4EC-37B62C8B0980}"/>
               </a:ext>
             </a:extLst>
           </p:cNvPr>
@@ -29743,8 +30062,8 @@
         </p:nvSpPr>
         <p:spPr>
           <a:xfrm>
-            <a:off x="1273548" y="1163309"/>
-            <a:ext cx="8896612" cy="707886"/>
+            <a:off x="3718561" y="1885696"/>
+            <a:ext cx="3611840" cy="3170099"/>
           </a:xfrm>
           <a:prstGeom prst="rect">
             <a:avLst/>
@@ -29757,148 +30076,191 @@
           </a:bodyPr>
           <a:lstStyle/>
           <a:p>
-            <a:r>
-              <a:rPr lang="en-US" sz="4000" b="1" i="0">
-                <a:solidFill>
-                  <a:srgbClr val="0D0D0D"/>
-                </a:solidFill>
-                <a:effectLst/>
-                <a:latin typeface="Times New Roman" panose="02020603050405020304" pitchFamily="18" charset="0"/>
-                <a:cs typeface="Times New Roman" panose="02020603050405020304" pitchFamily="18" charset="0"/>
-              </a:rPr>
-              <a:t>Key components and features of the 5G</a:t>
-            </a:r>
-            <a:endParaRPr lang="de-DE" sz="4000" b="1" dirty="0">
-              <a:latin typeface="Times New Roman" panose="02020603050405020304" pitchFamily="18" charset="0"/>
-              <a:cs typeface="Times New Roman" panose="02020603050405020304" pitchFamily="18" charset="0"/>
-            </a:endParaRPr>
-          </a:p>
-        </p:txBody>
-      </p:sp>
-      <p:sp>
-        <p:nvSpPr>
-          <p:cNvPr id="9" name="TextBox 8">
-            <a:extLst>
-              <a:ext uri="{FF2B5EF4-FFF2-40B4-BE49-F238E27FC236}">
-                <a16:creationId xmlns:a16="http://schemas.microsoft.com/office/drawing/2014/main" id="{276FCC2A-CA41-D789-A4EC-37B62C8B0980}"/>
-              </a:ext>
-            </a:extLst>
-          </p:cNvPr>
-          <p:cNvSpPr txBox="1"/>
-          <p:nvPr/>
-        </p:nvSpPr>
-        <p:spPr>
-          <a:xfrm>
-            <a:off x="2092960" y="2413337"/>
-            <a:ext cx="4978400" cy="1938992"/>
-          </a:xfrm>
-          <a:prstGeom prst="rect">
-            <a:avLst/>
-          </a:prstGeom>
-          <a:noFill/>
-        </p:spPr>
-        <p:txBody>
-          <a:bodyPr wrap="square" rtlCol="0">
-            <a:spAutoFit/>
-          </a:bodyPr>
-          <a:lstStyle/>
-          <a:p>
-            <a:pPr marL="285750" indent="-285750">
+            <a:pPr marL="197168" indent="-197168" defTabSz="630936">
+              <a:spcAft>
+                <a:spcPts val="600"/>
+              </a:spcAft>
               <a:buFont typeface="Arial" panose="020B0604020202020204" pitchFamily="34" charset="0"/>
               <a:buChar char="•"/>
             </a:pPr>
             <a:r>
-              <a:rPr lang="de-DE" sz="2000">
+              <a:rPr lang="de-DE" sz="2500" kern="1200" dirty="0" err="1">
+                <a:solidFill>
+                  <a:schemeClr val="tx1"/>
+                </a:solidFill>
                 <a:latin typeface="Times New Roman" panose="02020603050405020304" pitchFamily="18" charset="0"/>
+                <a:ea typeface="+mn-ea"/>
                 <a:cs typeface="Times New Roman" panose="02020603050405020304" pitchFamily="18" charset="0"/>
               </a:rPr>
-              <a:t>gNodeB (gNB)</a:t>
+              <a:t>gNodeB</a:t>
+            </a:r>
+            <a:r>
+              <a:rPr lang="de-DE" sz="2500" kern="1200" dirty="0">
+                <a:solidFill>
+                  <a:schemeClr val="tx1"/>
+                </a:solidFill>
+                <a:latin typeface="Times New Roman" panose="02020603050405020304" pitchFamily="18" charset="0"/>
+                <a:ea typeface="+mn-ea"/>
+                <a:cs typeface="Times New Roman" panose="02020603050405020304" pitchFamily="18" charset="0"/>
+              </a:rPr>
+              <a:t> (</a:t>
+            </a:r>
+            <a:r>
+              <a:rPr lang="de-DE" sz="2500" kern="1200" dirty="0" err="1">
+                <a:solidFill>
+                  <a:schemeClr val="tx1"/>
+                </a:solidFill>
+                <a:latin typeface="Times New Roman" panose="02020603050405020304" pitchFamily="18" charset="0"/>
+                <a:ea typeface="+mn-ea"/>
+                <a:cs typeface="Times New Roman" panose="02020603050405020304" pitchFamily="18" charset="0"/>
+              </a:rPr>
+              <a:t>gNB</a:t>
+            </a:r>
+            <a:r>
+              <a:rPr lang="de-DE" sz="2500" kern="1200" dirty="0">
+                <a:solidFill>
+                  <a:schemeClr val="tx1"/>
+                </a:solidFill>
+                <a:latin typeface="Times New Roman" panose="02020603050405020304" pitchFamily="18" charset="0"/>
+                <a:ea typeface="+mn-ea"/>
+                <a:cs typeface="Times New Roman" panose="02020603050405020304" pitchFamily="18" charset="0"/>
+              </a:rPr>
+              <a:t>)</a:t>
             </a:r>
           </a:p>
           <a:p>
-            <a:pPr marL="285750" indent="-285750">
+            <a:pPr marL="197168" indent="-197168" defTabSz="630936">
+              <a:spcAft>
+                <a:spcPts val="600"/>
+              </a:spcAft>
               <a:buFont typeface="Arial" panose="020B0604020202020204" pitchFamily="34" charset="0"/>
               <a:buChar char="•"/>
             </a:pPr>
             <a:r>
-              <a:rPr lang="de-DE" sz="2000" i="0">
+              <a:rPr lang="de-DE" sz="2500" kern="1200" dirty="0">
                 <a:solidFill>
                   <a:srgbClr val="0D0D0D"/>
                 </a:solidFill>
-                <a:effectLst/>
                 <a:latin typeface="Times New Roman" panose="02020603050405020304" pitchFamily="18" charset="0"/>
+                <a:ea typeface="+mn-ea"/>
                 <a:cs typeface="Times New Roman" panose="02020603050405020304" pitchFamily="18" charset="0"/>
               </a:rPr>
               <a:t>Core Network (5G)</a:t>
             </a:r>
           </a:p>
           <a:p>
-            <a:pPr marL="285750" indent="-285750">
+            <a:pPr marL="197168" indent="-197168" defTabSz="630936">
+              <a:spcAft>
+                <a:spcPts val="600"/>
+              </a:spcAft>
               <a:buFont typeface="Arial" panose="020B0604020202020204" pitchFamily="34" charset="0"/>
               <a:buChar char="•"/>
             </a:pPr>
             <a:r>
-              <a:rPr lang="de-DE" sz="2000" i="0">
+              <a:rPr lang="de-DE" sz="2500" kern="1200" dirty="0">
                 <a:solidFill>
                   <a:srgbClr val="0D0D0D"/>
                 </a:solidFill>
-                <a:effectLst/>
                 <a:latin typeface="Times New Roman" panose="02020603050405020304" pitchFamily="18" charset="0"/>
+                <a:ea typeface="+mn-ea"/>
                 <a:cs typeface="Times New Roman" panose="02020603050405020304" pitchFamily="18" charset="0"/>
               </a:rPr>
               <a:t>User Equipment (UE)</a:t>
             </a:r>
           </a:p>
           <a:p>
-            <a:pPr marL="285750" indent="-285750">
+            <a:pPr marL="197168" indent="-197168" defTabSz="630936">
+              <a:spcAft>
+                <a:spcPts val="600"/>
+              </a:spcAft>
               <a:buFont typeface="Arial" panose="020B0604020202020204" pitchFamily="34" charset="0"/>
               <a:buChar char="•"/>
             </a:pPr>
             <a:r>
-              <a:rPr lang="de-DE" sz="2000" i="0">
+              <a:rPr lang="de-DE" sz="2500" kern="1200" dirty="0">
                 <a:solidFill>
                   <a:srgbClr val="0D0D0D"/>
                 </a:solidFill>
-                <a:effectLst/>
                 <a:latin typeface="Times New Roman" panose="02020603050405020304" pitchFamily="18" charset="0"/>
+                <a:ea typeface="+mn-ea"/>
                 <a:cs typeface="Times New Roman" panose="02020603050405020304" pitchFamily="18" charset="0"/>
               </a:rPr>
-              <a:t>Network Functions (NFs)</a:t>
+              <a:t>Network </a:t>
+            </a:r>
+            <a:r>
+              <a:rPr lang="de-DE" sz="2500" kern="1200" dirty="0" err="1">
+                <a:solidFill>
+                  <a:srgbClr val="0D0D0D"/>
+                </a:solidFill>
+                <a:latin typeface="Times New Roman" panose="02020603050405020304" pitchFamily="18" charset="0"/>
+                <a:ea typeface="+mn-ea"/>
+                <a:cs typeface="Times New Roman" panose="02020603050405020304" pitchFamily="18" charset="0"/>
+              </a:rPr>
+              <a:t>Functions</a:t>
+            </a:r>
+            <a:r>
+              <a:rPr lang="de-DE" sz="2500" kern="1200" dirty="0">
+                <a:solidFill>
+                  <a:srgbClr val="0D0D0D"/>
+                </a:solidFill>
+                <a:latin typeface="Times New Roman" panose="02020603050405020304" pitchFamily="18" charset="0"/>
+                <a:ea typeface="+mn-ea"/>
+                <a:cs typeface="Times New Roman" panose="02020603050405020304" pitchFamily="18" charset="0"/>
+              </a:rPr>
+              <a:t> (NFs)</a:t>
             </a:r>
           </a:p>
           <a:p>
-            <a:pPr marL="285750" indent="-285750">
+            <a:pPr marL="197168" indent="-197168" defTabSz="630936">
+              <a:spcAft>
+                <a:spcPts val="600"/>
+              </a:spcAft>
               <a:buFont typeface="Arial" panose="020B0604020202020204" pitchFamily="34" charset="0"/>
               <a:buChar char="•"/>
             </a:pPr>
             <a:r>
-              <a:rPr lang="de-DE" sz="2000" i="0">
+              <a:rPr lang="de-DE" sz="2500" kern="1200" dirty="0">
                 <a:solidFill>
                   <a:srgbClr val="0D0D0D"/>
                 </a:solidFill>
-                <a:effectLst/>
                 <a:latin typeface="Times New Roman" panose="02020603050405020304" pitchFamily="18" charset="0"/>
+                <a:ea typeface="+mn-ea"/>
                 <a:cs typeface="Times New Roman" panose="02020603050405020304" pitchFamily="18" charset="0"/>
               </a:rPr>
               <a:t>Interfaces</a:t>
             </a:r>
           </a:p>
           <a:p>
-            <a:pPr marL="285750" indent="-285750">
+            <a:pPr marL="197168" indent="-197168" defTabSz="630936">
+              <a:spcAft>
+                <a:spcPts val="600"/>
+              </a:spcAft>
               <a:buFont typeface="Arial" panose="020B0604020202020204" pitchFamily="34" charset="0"/>
               <a:buChar char="•"/>
             </a:pPr>
             <a:r>
-              <a:rPr lang="de-DE" sz="2000">
+              <a:rPr lang="de-DE" sz="2500" kern="1200" dirty="0">
                 <a:solidFill>
                   <a:srgbClr val="0D0D0D"/>
                 </a:solidFill>
                 <a:latin typeface="Times New Roman" panose="02020603050405020304" pitchFamily="18" charset="0"/>
+                <a:ea typeface="+mn-ea"/>
                 <a:cs typeface="Times New Roman" panose="02020603050405020304" pitchFamily="18" charset="0"/>
               </a:rPr>
-              <a:t>Network Slicing</a:t>
+              <a:t>Network </a:t>
             </a:r>
-            <a:endParaRPr lang="de-DE" sz="2000" dirty="0">
+            <a:r>
+              <a:rPr lang="de-DE" sz="2500" kern="1200" dirty="0" err="1">
+                <a:solidFill>
+                  <a:srgbClr val="0D0D0D"/>
+                </a:solidFill>
+                <a:latin typeface="Times New Roman" panose="02020603050405020304" pitchFamily="18" charset="0"/>
+                <a:ea typeface="+mn-ea"/>
+                <a:cs typeface="Times New Roman" panose="02020603050405020304" pitchFamily="18" charset="0"/>
+              </a:rPr>
+              <a:t>Slicing</a:t>
+            </a:r>
+            <a:endParaRPr lang="de-DE" sz="2500" dirty="0">
               <a:latin typeface="Times New Roman" panose="02020603050405020304" pitchFamily="18" charset="0"/>
               <a:cs typeface="Times New Roman" panose="02020603050405020304" pitchFamily="18" charset="0"/>
             </a:endParaRPr>
@@ -30032,8 +30394,32 @@
           <a:lstStyle/>
           <a:p>
             <a:r>
-              <a:rPr lang="de-DE" sz="4000" b="1"/>
-              <a:t>gNodeB (gNB)</a:t>
+              <a:rPr lang="de-DE" sz="4000" b="1" dirty="0" err="1">
+                <a:latin typeface="Times New Roman" panose="02020603050405020304" pitchFamily="18" charset="0"/>
+                <a:cs typeface="Times New Roman" panose="02020603050405020304" pitchFamily="18" charset="0"/>
+              </a:rPr>
+              <a:t>gNodeB</a:t>
+            </a:r>
+            <a:r>
+              <a:rPr lang="de-DE" sz="4000" b="1" dirty="0">
+                <a:latin typeface="Times New Roman" panose="02020603050405020304" pitchFamily="18" charset="0"/>
+                <a:cs typeface="Times New Roman" panose="02020603050405020304" pitchFamily="18" charset="0"/>
+              </a:rPr>
+              <a:t> (</a:t>
+            </a:r>
+            <a:r>
+              <a:rPr lang="de-DE" sz="4000" b="1" dirty="0" err="1">
+                <a:latin typeface="Times New Roman" panose="02020603050405020304" pitchFamily="18" charset="0"/>
+                <a:cs typeface="Times New Roman" panose="02020603050405020304" pitchFamily="18" charset="0"/>
+              </a:rPr>
+              <a:t>gNB</a:t>
+            </a:r>
+            <a:r>
+              <a:rPr lang="de-DE" sz="4000" b="1" dirty="0">
+                <a:latin typeface="Times New Roman" panose="02020603050405020304" pitchFamily="18" charset="0"/>
+                <a:cs typeface="Times New Roman" panose="02020603050405020304" pitchFamily="18" charset="0"/>
+              </a:rPr>
+              <a:t>)</a:t>
             </a:r>
           </a:p>
         </p:txBody>
@@ -30066,15 +30452,82 @@
           </a:bodyPr>
           <a:lstStyle/>
           <a:p>
+            <a:pPr marL="0" indent="0">
+              <a:buNone/>
+            </a:pPr>
             <a:r>
-              <a:rPr lang="en-US" sz="2000" b="0" i="0">
+              <a:rPr lang="en-US" sz="2000" b="0" i="0" dirty="0">
                 <a:effectLst/>
                 <a:latin typeface="Times New Roman" panose="02020603050405020304" pitchFamily="18" charset="0"/>
                 <a:cs typeface="Times New Roman" panose="02020603050405020304" pitchFamily="18" charset="0"/>
               </a:rPr>
-              <a:t>The gNodeB is a critical component in 5G networks, acting as the next-generation base station that connects mobile devices to the network. It supports Massive MIMO technology, enhancing network capacity and efficiency. gNodeB is vital for delivering 5G's key features, such as high-speed broadband and ultra-reliable, low-latency communications. It enables flexible deployment across various environments, from urban to rural, through macro, micro, and pico cells. Additionally, gNodeB is essential for implementing network slicing, allowing for customized network segments tailored to specific applications or services.</a:t>
+              <a:t>The </a:t>
             </a:r>
-            <a:endParaRPr lang="de-DE" sz="2000">
+            <a:r>
+              <a:rPr lang="en-US" sz="2000" b="0" i="0" dirty="0" err="1">
+                <a:effectLst/>
+                <a:latin typeface="Times New Roman" panose="02020603050405020304" pitchFamily="18" charset="0"/>
+                <a:cs typeface="Times New Roman" panose="02020603050405020304" pitchFamily="18" charset="0"/>
+              </a:rPr>
+              <a:t>gNodeB</a:t>
+            </a:r>
+            <a:r>
+              <a:rPr lang="en-US" sz="2000" b="0" i="0" dirty="0">
+                <a:effectLst/>
+                <a:latin typeface="Times New Roman" panose="02020603050405020304" pitchFamily="18" charset="0"/>
+                <a:cs typeface="Times New Roman" panose="02020603050405020304" pitchFamily="18" charset="0"/>
+              </a:rPr>
+              <a:t> is a critical component in 5G networks, acting as the next-generation base station that connects mobile devices to the network. It supports Massive MIMO technology, enhancing network capacity and efficiency. </a:t>
+            </a:r>
+            <a:r>
+              <a:rPr lang="en-US" sz="2000" b="0" i="0" dirty="0" err="1">
+                <a:effectLst/>
+                <a:latin typeface="Times New Roman" panose="02020603050405020304" pitchFamily="18" charset="0"/>
+                <a:cs typeface="Times New Roman" panose="02020603050405020304" pitchFamily="18" charset="0"/>
+              </a:rPr>
+              <a:t>gNodeB</a:t>
+            </a:r>
+            <a:r>
+              <a:rPr lang="en-US" sz="2000" b="0" i="0" dirty="0">
+                <a:effectLst/>
+                <a:latin typeface="Times New Roman" panose="02020603050405020304" pitchFamily="18" charset="0"/>
+                <a:cs typeface="Times New Roman" panose="02020603050405020304" pitchFamily="18" charset="0"/>
+              </a:rPr>
+              <a:t> is vital for delivering 5G's key features, such as high-speed broadband and ultra-reliable, low-latency communications. It enables flexible deployment across various environments, from urban to rural, through macro, micro, and </a:t>
+            </a:r>
+            <a:r>
+              <a:rPr lang="en-US" sz="2000" b="0" i="0" dirty="0" err="1">
+                <a:effectLst/>
+                <a:latin typeface="Times New Roman" panose="02020603050405020304" pitchFamily="18" charset="0"/>
+                <a:cs typeface="Times New Roman" panose="02020603050405020304" pitchFamily="18" charset="0"/>
+              </a:rPr>
+              <a:t>pico</a:t>
+            </a:r>
+            <a:r>
+              <a:rPr lang="en-US" sz="2000" b="0" i="0" dirty="0">
+                <a:effectLst/>
+                <a:latin typeface="Times New Roman" panose="02020603050405020304" pitchFamily="18" charset="0"/>
+                <a:cs typeface="Times New Roman" panose="02020603050405020304" pitchFamily="18" charset="0"/>
+              </a:rPr>
+              <a:t> cells. Additionally, </a:t>
+            </a:r>
+            <a:r>
+              <a:rPr lang="en-US" sz="2000" b="0" i="0" dirty="0" err="1">
+                <a:effectLst/>
+                <a:latin typeface="Times New Roman" panose="02020603050405020304" pitchFamily="18" charset="0"/>
+                <a:cs typeface="Times New Roman" panose="02020603050405020304" pitchFamily="18" charset="0"/>
+              </a:rPr>
+              <a:t>gNodeB</a:t>
+            </a:r>
+            <a:r>
+              <a:rPr lang="en-US" sz="2000" b="0" i="0" dirty="0">
+                <a:effectLst/>
+                <a:latin typeface="Times New Roman" panose="02020603050405020304" pitchFamily="18" charset="0"/>
+                <a:cs typeface="Times New Roman" panose="02020603050405020304" pitchFamily="18" charset="0"/>
+              </a:rPr>
+              <a:t> is essential for implementing network slicing, allowing for customized network segments tailored to specific applications or services.</a:t>
+            </a:r>
+            <a:endParaRPr lang="de-DE" sz="2000" dirty="0">
               <a:latin typeface="Times New Roman" panose="02020603050405020304" pitchFamily="18" charset="0"/>
               <a:cs typeface="Times New Roman" panose="02020603050405020304" pitchFamily="18" charset="0"/>
             </a:endParaRPr>

</xml_diff>